<commit_message>
update figures including new dataset gse
</commit_message>
<xml_diff>
--- a/figures/Figure1.pptx
+++ b/figures/Figure1.pptx
@@ -2,7 +2,7 @@
 <file path=ppt/presentation.xml><?xml version="1.0" encoding="utf-8"?>
 <p:presentation xmlns:a="http://schemas.openxmlformats.org/drawingml/2006/main" xmlns:r="http://schemas.openxmlformats.org/officeDocument/2006/relationships" xmlns:p="http://schemas.openxmlformats.org/presentationml/2006/main" saveSubsetFonts="1" autoCompressPictures="0">
   <p:sldMasterIdLst>
-    <p:sldMasterId id="2147483672" r:id="rId1"/>
+    <p:sldMasterId id="2147483732" r:id="rId1"/>
   </p:sldMasterIdLst>
   <p:notesMasterIdLst>
     <p:notesMasterId r:id="rId3"/>
@@ -10,7 +10,7 @@
   <p:sldIdLst>
     <p:sldId id="285" r:id="rId2"/>
   </p:sldIdLst>
-  <p:sldSz cx="12192000" cy="8686800"/>
+  <p:sldSz cx="11879263" cy="8999538"/>
   <p:notesSz cx="6858000" cy="9144000"/>
   <p:defaultTextStyle>
     <a:defPPr>
@@ -110,12 +110,12 @@
   <p:extLst>
     <p:ext uri="{EFAFB233-063F-42B5-8137-9DF3F51BA10A}">
       <p15:sldGuideLst xmlns:p15="http://schemas.microsoft.com/office/powerpoint/2012/main">
-        <p15:guide id="1" orient="horz" pos="2736" userDrawn="1">
+        <p15:guide id="1" orient="horz" pos="2835" userDrawn="1">
           <p15:clr>
             <a:srgbClr val="A4A3A4"/>
           </p15:clr>
         </p15:guide>
-        <p15:guide id="2" pos="3840" userDrawn="1">
+        <p15:guide id="2" pos="3742" userDrawn="1">
           <p15:clr>
             <a:srgbClr val="A4A3A4"/>
           </p15:clr>
@@ -208,7 +208,7 @@
           <a:p>
             <a:fld id="{6D9F3238-22D1-DD4D-8759-38C3FE771049}" type="datetimeFigureOut">
               <a:rPr lang="en-US" smtClean="0"/>
-              <a:t>8/13/23</a:t>
+              <a:t>9/17/24</a:t>
             </a:fld>
             <a:endParaRPr lang="en-US"/>
           </a:p>
@@ -226,8 +226,8 @@
         </p:nvSpPr>
         <p:spPr>
           <a:xfrm>
-            <a:off x="1263650" y="1143000"/>
-            <a:ext cx="4330700" cy="3086100"/>
+            <a:off x="1392238" y="1143000"/>
+            <a:ext cx="4073525" cy="3086100"/>
           </a:xfrm>
           <a:prstGeom prst="rect">
             <a:avLst/>
@@ -504,8 +504,8 @@
         </p:nvSpPr>
         <p:spPr>
           <a:xfrm>
-            <a:off x="1263650" y="1143000"/>
-            <a:ext cx="4330700" cy="3086100"/>
+            <a:off x="1392238" y="1143000"/>
+            <a:ext cx="4073525" cy="3086100"/>
           </a:xfrm>
         </p:spPr>
       </p:sp>
@@ -593,15 +593,15 @@
         </p:nvSpPr>
         <p:spPr>
           <a:xfrm>
-            <a:off x="914400" y="1421660"/>
-            <a:ext cx="10363200" cy="3024293"/>
+            <a:off x="890945" y="1472842"/>
+            <a:ext cx="10097374" cy="3133172"/>
           </a:xfrm>
         </p:spPr>
         <p:txBody>
           <a:bodyPr anchor="b"/>
           <a:lstStyle>
             <a:lvl1pPr algn="ctr">
-              <a:defRPr sz="7600"/>
+              <a:defRPr sz="7795"/>
             </a:lvl1pPr>
           </a:lstStyle>
           <a:p>
@@ -625,8 +625,8 @@
         </p:nvSpPr>
         <p:spPr>
           <a:xfrm>
-            <a:off x="1524000" y="4562581"/>
-            <a:ext cx="9144000" cy="2097299"/>
+            <a:off x="1484908" y="4726842"/>
+            <a:ext cx="8909447" cy="2172804"/>
           </a:xfrm>
         </p:spPr>
         <p:txBody>
@@ -634,39 +634,39 @@
           <a:lstStyle>
             <a:lvl1pPr marL="0" indent="0" algn="ctr">
               <a:buNone/>
-              <a:defRPr sz="3040"/>
+              <a:defRPr sz="3118"/>
             </a:lvl1pPr>
-            <a:lvl2pPr marL="579135" indent="0" algn="ctr">
+            <a:lvl2pPr marL="593949" indent="0" algn="ctr">
               <a:buNone/>
-              <a:defRPr sz="2533"/>
+              <a:defRPr sz="2598"/>
             </a:lvl2pPr>
-            <a:lvl3pPr marL="1158270" indent="0" algn="ctr">
+            <a:lvl3pPr marL="1187897" indent="0" algn="ctr">
               <a:buNone/>
-              <a:defRPr sz="2280"/>
+              <a:defRPr sz="2338"/>
             </a:lvl3pPr>
-            <a:lvl4pPr marL="1737406" indent="0" algn="ctr">
+            <a:lvl4pPr marL="1781846" indent="0" algn="ctr">
               <a:buNone/>
-              <a:defRPr sz="2027"/>
+              <a:defRPr sz="2079"/>
             </a:lvl4pPr>
-            <a:lvl5pPr marL="2316541" indent="0" algn="ctr">
+            <a:lvl5pPr marL="2375794" indent="0" algn="ctr">
               <a:buNone/>
-              <a:defRPr sz="2027"/>
+              <a:defRPr sz="2079"/>
             </a:lvl5pPr>
-            <a:lvl6pPr marL="2895676" indent="0" algn="ctr">
+            <a:lvl6pPr marL="2969743" indent="0" algn="ctr">
               <a:buNone/>
-              <a:defRPr sz="2027"/>
+              <a:defRPr sz="2079"/>
             </a:lvl6pPr>
-            <a:lvl7pPr marL="3474811" indent="0" algn="ctr">
+            <a:lvl7pPr marL="3563691" indent="0" algn="ctr">
               <a:buNone/>
-              <a:defRPr sz="2027"/>
+              <a:defRPr sz="2079"/>
             </a:lvl7pPr>
-            <a:lvl8pPr marL="4053947" indent="0" algn="ctr">
+            <a:lvl8pPr marL="4157640" indent="0" algn="ctr">
               <a:buNone/>
-              <a:defRPr sz="2027"/>
+              <a:defRPr sz="2079"/>
             </a:lvl8pPr>
-            <a:lvl9pPr marL="4633082" indent="0" algn="ctr">
+            <a:lvl9pPr marL="4751588" indent="0" algn="ctr">
               <a:buNone/>
-              <a:defRPr sz="2027"/>
+              <a:defRPr sz="2079"/>
             </a:lvl9pPr>
           </a:lstStyle>
           <a:p>
@@ -695,7 +695,7 @@
           <a:p>
             <a:fld id="{06B6001C-1240-E64C-AE44-4A843ECD4F8A}" type="datetimeFigureOut">
               <a:rPr lang="en-US" smtClean="0"/>
-              <a:t>8/13/23</a:t>
+              <a:t>9/17/24</a:t>
             </a:fld>
             <a:endParaRPr lang="en-US"/>
           </a:p>
@@ -746,7 +746,7 @@
     </p:spTree>
     <p:extLst>
       <p:ext uri="{BB962C8B-B14F-4D97-AF65-F5344CB8AC3E}">
-        <p14:creationId xmlns:p14="http://schemas.microsoft.com/office/powerpoint/2010/main" val="736994611"/>
+        <p14:creationId xmlns:p14="http://schemas.microsoft.com/office/powerpoint/2010/main" val="3346482006"/>
       </p:ext>
     </p:extLst>
   </p:cSld>
@@ -865,7 +865,7 @@
           <a:p>
             <a:fld id="{06B6001C-1240-E64C-AE44-4A843ECD4F8A}" type="datetimeFigureOut">
               <a:rPr lang="en-US" smtClean="0"/>
-              <a:t>8/13/23</a:t>
+              <a:t>9/17/24</a:t>
             </a:fld>
             <a:endParaRPr lang="en-US"/>
           </a:p>
@@ -916,7 +916,7 @@
     </p:spTree>
     <p:extLst>
       <p:ext uri="{BB962C8B-B14F-4D97-AF65-F5344CB8AC3E}">
-        <p14:creationId xmlns:p14="http://schemas.microsoft.com/office/powerpoint/2010/main" val="3406855104"/>
+        <p14:creationId xmlns:p14="http://schemas.microsoft.com/office/powerpoint/2010/main" val="2924783526"/>
       </p:ext>
     </p:extLst>
   </p:cSld>
@@ -955,8 +955,8 @@
         </p:nvSpPr>
         <p:spPr>
           <a:xfrm>
-            <a:off x="8724901" y="462492"/>
-            <a:ext cx="2628900" cy="7361661"/>
+            <a:off x="8501098" y="479142"/>
+            <a:ext cx="2561466" cy="7626692"/>
           </a:xfrm>
         </p:spPr>
         <p:txBody>
@@ -983,8 +983,8 @@
         </p:nvSpPr>
         <p:spPr>
           <a:xfrm>
-            <a:off x="838201" y="462492"/>
-            <a:ext cx="7734300" cy="7361661"/>
+            <a:off x="816700" y="479142"/>
+            <a:ext cx="7535907" cy="7626692"/>
           </a:xfrm>
         </p:spPr>
         <p:txBody>
@@ -1045,7 +1045,7 @@
           <a:p>
             <a:fld id="{06B6001C-1240-E64C-AE44-4A843ECD4F8A}" type="datetimeFigureOut">
               <a:rPr lang="en-US" smtClean="0"/>
-              <a:t>8/13/23</a:t>
+              <a:t>9/17/24</a:t>
             </a:fld>
             <a:endParaRPr lang="en-US"/>
           </a:p>
@@ -1096,7 +1096,7 @@
     </p:spTree>
     <p:extLst>
       <p:ext uri="{BB962C8B-B14F-4D97-AF65-F5344CB8AC3E}">
-        <p14:creationId xmlns:p14="http://schemas.microsoft.com/office/powerpoint/2010/main" val="2338123061"/>
+        <p14:creationId xmlns:p14="http://schemas.microsoft.com/office/powerpoint/2010/main" val="2446020155"/>
       </p:ext>
     </p:extLst>
   </p:cSld>
@@ -1215,7 +1215,7 @@
           <a:p>
             <a:fld id="{06B6001C-1240-E64C-AE44-4A843ECD4F8A}" type="datetimeFigureOut">
               <a:rPr lang="en-US" smtClean="0"/>
-              <a:t>8/13/23</a:t>
+              <a:t>9/17/24</a:t>
             </a:fld>
             <a:endParaRPr lang="en-US"/>
           </a:p>
@@ -1266,7 +1266,7 @@
     </p:spTree>
     <p:extLst>
       <p:ext uri="{BB962C8B-B14F-4D97-AF65-F5344CB8AC3E}">
-        <p14:creationId xmlns:p14="http://schemas.microsoft.com/office/powerpoint/2010/main" val="3202315954"/>
+        <p14:creationId xmlns:p14="http://schemas.microsoft.com/office/powerpoint/2010/main" val="688510932"/>
       </p:ext>
     </p:extLst>
   </p:cSld>
@@ -1305,15 +1305,15 @@
         </p:nvSpPr>
         <p:spPr>
           <a:xfrm>
-            <a:off x="831851" y="2165670"/>
-            <a:ext cx="10515600" cy="3613467"/>
+            <a:off x="810513" y="2243638"/>
+            <a:ext cx="10245864" cy="3743557"/>
           </a:xfrm>
         </p:spPr>
         <p:txBody>
           <a:bodyPr anchor="b"/>
           <a:lstStyle>
             <a:lvl1pPr>
-              <a:defRPr sz="7600"/>
+              <a:defRPr sz="7795"/>
             </a:lvl1pPr>
           </a:lstStyle>
           <a:p>
@@ -1337,8 +1337,8 @@
         </p:nvSpPr>
         <p:spPr>
           <a:xfrm>
-            <a:off x="831851" y="5813322"/>
-            <a:ext cx="10515600" cy="1900237"/>
+            <a:off x="810513" y="6022610"/>
+            <a:ext cx="10245864" cy="1968648"/>
           </a:xfrm>
         </p:spPr>
         <p:txBody>
@@ -1346,15 +1346,15 @@
           <a:lstStyle>
             <a:lvl1pPr marL="0" indent="0">
               <a:buNone/>
-              <a:defRPr sz="3040">
+              <a:defRPr sz="3118">
                 <a:solidFill>
                   <a:schemeClr val="tx1"/>
                 </a:solidFill>
               </a:defRPr>
             </a:lvl1pPr>
-            <a:lvl2pPr marL="579135" indent="0">
+            <a:lvl2pPr marL="593949" indent="0">
               <a:buNone/>
-              <a:defRPr sz="2533">
+              <a:defRPr sz="2598">
                 <a:solidFill>
                   <a:schemeClr val="tx1">
                     <a:tint val="75000"/>
@@ -1362,9 +1362,9 @@
                 </a:solidFill>
               </a:defRPr>
             </a:lvl2pPr>
-            <a:lvl3pPr marL="1158270" indent="0">
+            <a:lvl3pPr marL="1187897" indent="0">
               <a:buNone/>
-              <a:defRPr sz="2280">
+              <a:defRPr sz="2338">
                 <a:solidFill>
                   <a:schemeClr val="tx1">
                     <a:tint val="75000"/>
@@ -1372,9 +1372,9 @@
                 </a:solidFill>
               </a:defRPr>
             </a:lvl3pPr>
-            <a:lvl4pPr marL="1737406" indent="0">
+            <a:lvl4pPr marL="1781846" indent="0">
               <a:buNone/>
-              <a:defRPr sz="2027">
+              <a:defRPr sz="2079">
                 <a:solidFill>
                   <a:schemeClr val="tx1">
                     <a:tint val="75000"/>
@@ -1382,9 +1382,9 @@
                 </a:solidFill>
               </a:defRPr>
             </a:lvl4pPr>
-            <a:lvl5pPr marL="2316541" indent="0">
+            <a:lvl5pPr marL="2375794" indent="0">
               <a:buNone/>
-              <a:defRPr sz="2027">
+              <a:defRPr sz="2079">
                 <a:solidFill>
                   <a:schemeClr val="tx1">
                     <a:tint val="75000"/>
@@ -1392,9 +1392,9 @@
                 </a:solidFill>
               </a:defRPr>
             </a:lvl5pPr>
-            <a:lvl6pPr marL="2895676" indent="0">
+            <a:lvl6pPr marL="2969743" indent="0">
               <a:buNone/>
-              <a:defRPr sz="2027">
+              <a:defRPr sz="2079">
                 <a:solidFill>
                   <a:schemeClr val="tx1">
                     <a:tint val="75000"/>
@@ -1402,9 +1402,9 @@
                 </a:solidFill>
               </a:defRPr>
             </a:lvl6pPr>
-            <a:lvl7pPr marL="3474811" indent="0">
+            <a:lvl7pPr marL="3563691" indent="0">
               <a:buNone/>
-              <a:defRPr sz="2027">
+              <a:defRPr sz="2079">
                 <a:solidFill>
                   <a:schemeClr val="tx1">
                     <a:tint val="75000"/>
@@ -1412,9 +1412,9 @@
                 </a:solidFill>
               </a:defRPr>
             </a:lvl7pPr>
-            <a:lvl8pPr marL="4053947" indent="0">
+            <a:lvl8pPr marL="4157640" indent="0">
               <a:buNone/>
-              <a:defRPr sz="2027">
+              <a:defRPr sz="2079">
                 <a:solidFill>
                   <a:schemeClr val="tx1">
                     <a:tint val="75000"/>
@@ -1422,9 +1422,9 @@
                 </a:solidFill>
               </a:defRPr>
             </a:lvl8pPr>
-            <a:lvl9pPr marL="4633082" indent="0">
+            <a:lvl9pPr marL="4751588" indent="0">
               <a:buNone/>
-              <a:defRPr sz="2027">
+              <a:defRPr sz="2079">
                 <a:solidFill>
                   <a:schemeClr val="tx1">
                     <a:tint val="75000"/>
@@ -1459,7 +1459,7 @@
           <a:p>
             <a:fld id="{06B6001C-1240-E64C-AE44-4A843ECD4F8A}" type="datetimeFigureOut">
               <a:rPr lang="en-US" smtClean="0"/>
-              <a:t>8/13/23</a:t>
+              <a:t>9/17/24</a:t>
             </a:fld>
             <a:endParaRPr lang="en-US"/>
           </a:p>
@@ -1510,7 +1510,7 @@
     </p:spTree>
     <p:extLst>
       <p:ext uri="{BB962C8B-B14F-4D97-AF65-F5344CB8AC3E}">
-        <p14:creationId xmlns:p14="http://schemas.microsoft.com/office/powerpoint/2010/main" val="3878440382"/>
+        <p14:creationId xmlns:p14="http://schemas.microsoft.com/office/powerpoint/2010/main" val="2153734389"/>
       </p:ext>
     </p:extLst>
   </p:cSld>
@@ -1572,8 +1572,8 @@
         </p:nvSpPr>
         <p:spPr>
           <a:xfrm>
-            <a:off x="838200" y="2312458"/>
-            <a:ext cx="5181600" cy="5511695"/>
+            <a:off x="816699" y="2395710"/>
+            <a:ext cx="5048687" cy="5710124"/>
           </a:xfrm>
         </p:spPr>
         <p:txBody>
@@ -1629,8 +1629,8 @@
         </p:nvSpPr>
         <p:spPr>
           <a:xfrm>
-            <a:off x="6172200" y="2312458"/>
-            <a:ext cx="5181600" cy="5511695"/>
+            <a:off x="6013877" y="2395710"/>
+            <a:ext cx="5048687" cy="5710124"/>
           </a:xfrm>
         </p:spPr>
         <p:txBody>
@@ -1691,7 +1691,7 @@
           <a:p>
             <a:fld id="{06B6001C-1240-E64C-AE44-4A843ECD4F8A}" type="datetimeFigureOut">
               <a:rPr lang="en-US" smtClean="0"/>
-              <a:t>8/13/23</a:t>
+              <a:t>9/17/24</a:t>
             </a:fld>
             <a:endParaRPr lang="en-US"/>
           </a:p>
@@ -1742,7 +1742,7 @@
     </p:spTree>
     <p:extLst>
       <p:ext uri="{BB962C8B-B14F-4D97-AF65-F5344CB8AC3E}">
-        <p14:creationId xmlns:p14="http://schemas.microsoft.com/office/powerpoint/2010/main" val="2428317828"/>
+        <p14:creationId xmlns:p14="http://schemas.microsoft.com/office/powerpoint/2010/main" val="3945891022"/>
       </p:ext>
     </p:extLst>
   </p:cSld>
@@ -1752,12 +1752,12 @@
   <p:extLst>
     <p:ext uri="{DCECCB84-F9BA-43D5-87BE-67443E8EF086}">
       <p15:sldGuideLst xmlns:p15="http://schemas.microsoft.com/office/powerpoint/2012/main">
-        <p15:guide id="1" orient="horz" pos="2736" userDrawn="1">
+        <p15:guide id="1" orient="horz" pos="2835" userDrawn="1">
           <p15:clr>
             <a:srgbClr val="FBAE40"/>
           </p15:clr>
         </p15:guide>
-        <p15:guide id="2" pos="3840" userDrawn="1">
+        <p15:guide id="2" pos="3742" userDrawn="1">
           <p15:clr>
             <a:srgbClr val="FBAE40"/>
           </p15:clr>
@@ -1797,8 +1797,8 @@
         </p:nvSpPr>
         <p:spPr>
           <a:xfrm>
-            <a:off x="839788" y="462494"/>
-            <a:ext cx="10515600" cy="1679046"/>
+            <a:off x="818247" y="479144"/>
+            <a:ext cx="10245864" cy="1739495"/>
           </a:xfrm>
         </p:spPr>
         <p:txBody>
@@ -1825,8 +1825,8 @@
         </p:nvSpPr>
         <p:spPr>
           <a:xfrm>
-            <a:off x="839789" y="2129473"/>
-            <a:ext cx="5157787" cy="1043622"/>
+            <a:off x="818248" y="2206137"/>
+            <a:ext cx="5025484" cy="1081194"/>
           </a:xfrm>
         </p:spPr>
         <p:txBody>
@@ -1834,39 +1834,39 @@
           <a:lstStyle>
             <a:lvl1pPr marL="0" indent="0">
               <a:buNone/>
-              <a:defRPr sz="3040" b="1"/>
+              <a:defRPr sz="3118" b="1"/>
             </a:lvl1pPr>
-            <a:lvl2pPr marL="579135" indent="0">
+            <a:lvl2pPr marL="593949" indent="0">
               <a:buNone/>
-              <a:defRPr sz="2533" b="1"/>
+              <a:defRPr sz="2598" b="1"/>
             </a:lvl2pPr>
-            <a:lvl3pPr marL="1158270" indent="0">
+            <a:lvl3pPr marL="1187897" indent="0">
               <a:buNone/>
-              <a:defRPr sz="2280" b="1"/>
+              <a:defRPr sz="2338" b="1"/>
             </a:lvl3pPr>
-            <a:lvl4pPr marL="1737406" indent="0">
+            <a:lvl4pPr marL="1781846" indent="0">
               <a:buNone/>
-              <a:defRPr sz="2027" b="1"/>
+              <a:defRPr sz="2079" b="1"/>
             </a:lvl4pPr>
-            <a:lvl5pPr marL="2316541" indent="0">
+            <a:lvl5pPr marL="2375794" indent="0">
               <a:buNone/>
-              <a:defRPr sz="2027" b="1"/>
+              <a:defRPr sz="2079" b="1"/>
             </a:lvl5pPr>
-            <a:lvl6pPr marL="2895676" indent="0">
+            <a:lvl6pPr marL="2969743" indent="0">
               <a:buNone/>
-              <a:defRPr sz="2027" b="1"/>
+              <a:defRPr sz="2079" b="1"/>
             </a:lvl6pPr>
-            <a:lvl7pPr marL="3474811" indent="0">
+            <a:lvl7pPr marL="3563691" indent="0">
               <a:buNone/>
-              <a:defRPr sz="2027" b="1"/>
+              <a:defRPr sz="2079" b="1"/>
             </a:lvl7pPr>
-            <a:lvl8pPr marL="4053947" indent="0">
+            <a:lvl8pPr marL="4157640" indent="0">
               <a:buNone/>
-              <a:defRPr sz="2027" b="1"/>
+              <a:defRPr sz="2079" b="1"/>
             </a:lvl8pPr>
-            <a:lvl9pPr marL="4633082" indent="0">
+            <a:lvl9pPr marL="4751588" indent="0">
               <a:buNone/>
-              <a:defRPr sz="2027" b="1"/>
+              <a:defRPr sz="2079" b="1"/>
             </a:lvl9pPr>
           </a:lstStyle>
           <a:p>
@@ -1890,8 +1890,8 @@
         </p:nvSpPr>
         <p:spPr>
           <a:xfrm>
-            <a:off x="839789" y="3173095"/>
-            <a:ext cx="5157787" cy="4667145"/>
+            <a:off x="818248" y="3287331"/>
+            <a:ext cx="5025484" cy="4835169"/>
           </a:xfrm>
         </p:spPr>
         <p:txBody>
@@ -1947,8 +1947,8 @@
         </p:nvSpPr>
         <p:spPr>
           <a:xfrm>
-            <a:off x="6172201" y="2129473"/>
-            <a:ext cx="5183188" cy="1043622"/>
+            <a:off x="6013878" y="2206137"/>
+            <a:ext cx="5050234" cy="1081194"/>
           </a:xfrm>
         </p:spPr>
         <p:txBody>
@@ -1956,39 +1956,39 @@
           <a:lstStyle>
             <a:lvl1pPr marL="0" indent="0">
               <a:buNone/>
-              <a:defRPr sz="3040" b="1"/>
+              <a:defRPr sz="3118" b="1"/>
             </a:lvl1pPr>
-            <a:lvl2pPr marL="579135" indent="0">
+            <a:lvl2pPr marL="593949" indent="0">
               <a:buNone/>
-              <a:defRPr sz="2533" b="1"/>
+              <a:defRPr sz="2598" b="1"/>
             </a:lvl2pPr>
-            <a:lvl3pPr marL="1158270" indent="0">
+            <a:lvl3pPr marL="1187897" indent="0">
               <a:buNone/>
-              <a:defRPr sz="2280" b="1"/>
+              <a:defRPr sz="2338" b="1"/>
             </a:lvl3pPr>
-            <a:lvl4pPr marL="1737406" indent="0">
+            <a:lvl4pPr marL="1781846" indent="0">
               <a:buNone/>
-              <a:defRPr sz="2027" b="1"/>
+              <a:defRPr sz="2079" b="1"/>
             </a:lvl4pPr>
-            <a:lvl5pPr marL="2316541" indent="0">
+            <a:lvl5pPr marL="2375794" indent="0">
               <a:buNone/>
-              <a:defRPr sz="2027" b="1"/>
+              <a:defRPr sz="2079" b="1"/>
             </a:lvl5pPr>
-            <a:lvl6pPr marL="2895676" indent="0">
+            <a:lvl6pPr marL="2969743" indent="0">
               <a:buNone/>
-              <a:defRPr sz="2027" b="1"/>
+              <a:defRPr sz="2079" b="1"/>
             </a:lvl6pPr>
-            <a:lvl7pPr marL="3474811" indent="0">
+            <a:lvl7pPr marL="3563691" indent="0">
               <a:buNone/>
-              <a:defRPr sz="2027" b="1"/>
+              <a:defRPr sz="2079" b="1"/>
             </a:lvl7pPr>
-            <a:lvl8pPr marL="4053947" indent="0">
+            <a:lvl8pPr marL="4157640" indent="0">
               <a:buNone/>
-              <a:defRPr sz="2027" b="1"/>
+              <a:defRPr sz="2079" b="1"/>
             </a:lvl8pPr>
-            <a:lvl9pPr marL="4633082" indent="0">
+            <a:lvl9pPr marL="4751588" indent="0">
               <a:buNone/>
-              <a:defRPr sz="2027" b="1"/>
+              <a:defRPr sz="2079" b="1"/>
             </a:lvl9pPr>
           </a:lstStyle>
           <a:p>
@@ -2012,8 +2012,8 @@
         </p:nvSpPr>
         <p:spPr>
           <a:xfrm>
-            <a:off x="6172201" y="3173095"/>
-            <a:ext cx="5183188" cy="4667145"/>
+            <a:off x="6013878" y="3287331"/>
+            <a:ext cx="5050234" cy="4835169"/>
           </a:xfrm>
         </p:spPr>
         <p:txBody>
@@ -2074,7 +2074,7 @@
           <a:p>
             <a:fld id="{06B6001C-1240-E64C-AE44-4A843ECD4F8A}" type="datetimeFigureOut">
               <a:rPr lang="en-US" smtClean="0"/>
-              <a:t>8/13/23</a:t>
+              <a:t>9/17/24</a:t>
             </a:fld>
             <a:endParaRPr lang="en-US"/>
           </a:p>
@@ -2125,7 +2125,7 @@
     </p:spTree>
     <p:extLst>
       <p:ext uri="{BB962C8B-B14F-4D97-AF65-F5344CB8AC3E}">
-        <p14:creationId xmlns:p14="http://schemas.microsoft.com/office/powerpoint/2010/main" val="2187730506"/>
+        <p14:creationId xmlns:p14="http://schemas.microsoft.com/office/powerpoint/2010/main" val="2433743739"/>
       </p:ext>
     </p:extLst>
   </p:cSld>
@@ -2192,7 +2192,7 @@
           <a:p>
             <a:fld id="{06B6001C-1240-E64C-AE44-4A843ECD4F8A}" type="datetimeFigureOut">
               <a:rPr lang="en-US" smtClean="0"/>
-              <a:t>8/13/23</a:t>
+              <a:t>9/17/24</a:t>
             </a:fld>
             <a:endParaRPr lang="en-US"/>
           </a:p>
@@ -2243,7 +2243,7 @@
     </p:spTree>
     <p:extLst>
       <p:ext uri="{BB962C8B-B14F-4D97-AF65-F5344CB8AC3E}">
-        <p14:creationId xmlns:p14="http://schemas.microsoft.com/office/powerpoint/2010/main" val="152415117"/>
+        <p14:creationId xmlns:p14="http://schemas.microsoft.com/office/powerpoint/2010/main" val="231866601"/>
       </p:ext>
     </p:extLst>
   </p:cSld>
@@ -2287,7 +2287,7 @@
           <a:p>
             <a:fld id="{06B6001C-1240-E64C-AE44-4A843ECD4F8A}" type="datetimeFigureOut">
               <a:rPr lang="en-US" smtClean="0"/>
-              <a:t>8/13/23</a:t>
+              <a:t>9/17/24</a:t>
             </a:fld>
             <a:endParaRPr lang="en-US"/>
           </a:p>
@@ -2338,7 +2338,7 @@
     </p:spTree>
     <p:extLst>
       <p:ext uri="{BB962C8B-B14F-4D97-AF65-F5344CB8AC3E}">
-        <p14:creationId xmlns:p14="http://schemas.microsoft.com/office/powerpoint/2010/main" val="327637449"/>
+        <p14:creationId xmlns:p14="http://schemas.microsoft.com/office/powerpoint/2010/main" val="4146604073"/>
       </p:ext>
     </p:extLst>
   </p:cSld>
@@ -2377,15 +2377,15 @@
         </p:nvSpPr>
         <p:spPr>
           <a:xfrm>
-            <a:off x="839788" y="579120"/>
-            <a:ext cx="3932237" cy="2026920"/>
+            <a:off x="818246" y="599969"/>
+            <a:ext cx="3831372" cy="2099892"/>
           </a:xfrm>
         </p:spPr>
         <p:txBody>
           <a:bodyPr anchor="b"/>
           <a:lstStyle>
             <a:lvl1pPr>
-              <a:defRPr sz="4053"/>
+              <a:defRPr sz="4157"/>
             </a:lvl1pPr>
           </a:lstStyle>
           <a:p>
@@ -2409,39 +2409,39 @@
         </p:nvSpPr>
         <p:spPr>
           <a:xfrm>
-            <a:off x="5183188" y="1250740"/>
-            <a:ext cx="6172200" cy="6173258"/>
+            <a:off x="5050234" y="1295769"/>
+            <a:ext cx="6013877" cy="6395505"/>
           </a:xfrm>
         </p:spPr>
         <p:txBody>
           <a:bodyPr/>
           <a:lstStyle>
             <a:lvl1pPr>
-              <a:defRPr sz="4053"/>
+              <a:defRPr sz="4157"/>
             </a:lvl1pPr>
             <a:lvl2pPr>
-              <a:defRPr sz="3547"/>
+              <a:defRPr sz="3637"/>
             </a:lvl2pPr>
             <a:lvl3pPr>
-              <a:defRPr sz="3040"/>
+              <a:defRPr sz="3118"/>
             </a:lvl3pPr>
             <a:lvl4pPr>
-              <a:defRPr sz="2533"/>
+              <a:defRPr sz="2598"/>
             </a:lvl4pPr>
             <a:lvl5pPr>
-              <a:defRPr sz="2533"/>
+              <a:defRPr sz="2598"/>
             </a:lvl5pPr>
             <a:lvl6pPr>
-              <a:defRPr sz="2533"/>
+              <a:defRPr sz="2598"/>
             </a:lvl6pPr>
             <a:lvl7pPr>
-              <a:defRPr sz="2533"/>
+              <a:defRPr sz="2598"/>
             </a:lvl7pPr>
             <a:lvl8pPr>
-              <a:defRPr sz="2533"/>
+              <a:defRPr sz="2598"/>
             </a:lvl8pPr>
             <a:lvl9pPr>
-              <a:defRPr sz="2533"/>
+              <a:defRPr sz="2598"/>
             </a:lvl9pPr>
           </a:lstStyle>
           <a:p>
@@ -2494,8 +2494,8 @@
         </p:nvSpPr>
         <p:spPr>
           <a:xfrm>
-            <a:off x="839788" y="2606040"/>
-            <a:ext cx="3932237" cy="4828011"/>
+            <a:off x="818246" y="2699862"/>
+            <a:ext cx="3831372" cy="5001827"/>
           </a:xfrm>
         </p:spPr>
         <p:txBody>
@@ -2503,39 +2503,39 @@
           <a:lstStyle>
             <a:lvl1pPr marL="0" indent="0">
               <a:buNone/>
-              <a:defRPr sz="2027"/>
+              <a:defRPr sz="2079"/>
             </a:lvl1pPr>
-            <a:lvl2pPr marL="579135" indent="0">
+            <a:lvl2pPr marL="593949" indent="0">
               <a:buNone/>
-              <a:defRPr sz="1773"/>
+              <a:defRPr sz="1819"/>
             </a:lvl2pPr>
-            <a:lvl3pPr marL="1158270" indent="0">
+            <a:lvl3pPr marL="1187897" indent="0">
               <a:buNone/>
-              <a:defRPr sz="1520"/>
+              <a:defRPr sz="1559"/>
             </a:lvl3pPr>
-            <a:lvl4pPr marL="1737406" indent="0">
+            <a:lvl4pPr marL="1781846" indent="0">
               <a:buNone/>
-              <a:defRPr sz="1267"/>
+              <a:defRPr sz="1299"/>
             </a:lvl4pPr>
-            <a:lvl5pPr marL="2316541" indent="0">
+            <a:lvl5pPr marL="2375794" indent="0">
               <a:buNone/>
-              <a:defRPr sz="1267"/>
+              <a:defRPr sz="1299"/>
             </a:lvl5pPr>
-            <a:lvl6pPr marL="2895676" indent="0">
+            <a:lvl6pPr marL="2969743" indent="0">
               <a:buNone/>
-              <a:defRPr sz="1267"/>
+              <a:defRPr sz="1299"/>
             </a:lvl6pPr>
-            <a:lvl7pPr marL="3474811" indent="0">
+            <a:lvl7pPr marL="3563691" indent="0">
               <a:buNone/>
-              <a:defRPr sz="1267"/>
+              <a:defRPr sz="1299"/>
             </a:lvl7pPr>
-            <a:lvl8pPr marL="4053947" indent="0">
+            <a:lvl8pPr marL="4157640" indent="0">
               <a:buNone/>
-              <a:defRPr sz="1267"/>
+              <a:defRPr sz="1299"/>
             </a:lvl8pPr>
-            <a:lvl9pPr marL="4633082" indent="0">
+            <a:lvl9pPr marL="4751588" indent="0">
               <a:buNone/>
-              <a:defRPr sz="1267"/>
+              <a:defRPr sz="1299"/>
             </a:lvl9pPr>
           </a:lstStyle>
           <a:p>
@@ -2564,7 +2564,7 @@
           <a:p>
             <a:fld id="{06B6001C-1240-E64C-AE44-4A843ECD4F8A}" type="datetimeFigureOut">
               <a:rPr lang="en-US" smtClean="0"/>
-              <a:t>8/13/23</a:t>
+              <a:t>9/17/24</a:t>
             </a:fld>
             <a:endParaRPr lang="en-US"/>
           </a:p>
@@ -2615,7 +2615,7 @@
     </p:spTree>
     <p:extLst>
       <p:ext uri="{BB962C8B-B14F-4D97-AF65-F5344CB8AC3E}">
-        <p14:creationId xmlns:p14="http://schemas.microsoft.com/office/powerpoint/2010/main" val="2944921282"/>
+        <p14:creationId xmlns:p14="http://schemas.microsoft.com/office/powerpoint/2010/main" val="4180820679"/>
       </p:ext>
     </p:extLst>
   </p:cSld>
@@ -2654,15 +2654,15 @@
         </p:nvSpPr>
         <p:spPr>
           <a:xfrm>
-            <a:off x="839788" y="579120"/>
-            <a:ext cx="3932237" cy="2026920"/>
+            <a:off x="818246" y="599969"/>
+            <a:ext cx="3831372" cy="2099892"/>
           </a:xfrm>
         </p:spPr>
         <p:txBody>
           <a:bodyPr anchor="b"/>
           <a:lstStyle>
             <a:lvl1pPr>
-              <a:defRPr sz="4053"/>
+              <a:defRPr sz="4157"/>
             </a:lvl1pPr>
           </a:lstStyle>
           <a:p>
@@ -2686,8 +2686,8 @@
         </p:nvSpPr>
         <p:spPr>
           <a:xfrm>
-            <a:off x="5183188" y="1250740"/>
-            <a:ext cx="6172200" cy="6173258"/>
+            <a:off x="5050234" y="1295769"/>
+            <a:ext cx="6013877" cy="6395505"/>
           </a:xfrm>
         </p:spPr>
         <p:txBody>
@@ -2695,39 +2695,39 @@
           <a:lstStyle>
             <a:lvl1pPr marL="0" indent="0">
               <a:buNone/>
-              <a:defRPr sz="4053"/>
+              <a:defRPr sz="4157"/>
             </a:lvl1pPr>
-            <a:lvl2pPr marL="579135" indent="0">
+            <a:lvl2pPr marL="593949" indent="0">
               <a:buNone/>
-              <a:defRPr sz="3547"/>
+              <a:defRPr sz="3637"/>
             </a:lvl2pPr>
-            <a:lvl3pPr marL="1158270" indent="0">
+            <a:lvl3pPr marL="1187897" indent="0">
               <a:buNone/>
-              <a:defRPr sz="3040"/>
+              <a:defRPr sz="3118"/>
             </a:lvl3pPr>
-            <a:lvl4pPr marL="1737406" indent="0">
+            <a:lvl4pPr marL="1781846" indent="0">
               <a:buNone/>
-              <a:defRPr sz="2533"/>
+              <a:defRPr sz="2598"/>
             </a:lvl4pPr>
-            <a:lvl5pPr marL="2316541" indent="0">
+            <a:lvl5pPr marL="2375794" indent="0">
               <a:buNone/>
-              <a:defRPr sz="2533"/>
+              <a:defRPr sz="2598"/>
             </a:lvl5pPr>
-            <a:lvl6pPr marL="2895676" indent="0">
+            <a:lvl6pPr marL="2969743" indent="0">
               <a:buNone/>
-              <a:defRPr sz="2533"/>
+              <a:defRPr sz="2598"/>
             </a:lvl6pPr>
-            <a:lvl7pPr marL="3474811" indent="0">
+            <a:lvl7pPr marL="3563691" indent="0">
               <a:buNone/>
-              <a:defRPr sz="2533"/>
+              <a:defRPr sz="2598"/>
             </a:lvl7pPr>
-            <a:lvl8pPr marL="4053947" indent="0">
+            <a:lvl8pPr marL="4157640" indent="0">
               <a:buNone/>
-              <a:defRPr sz="2533"/>
+              <a:defRPr sz="2598"/>
             </a:lvl8pPr>
-            <a:lvl9pPr marL="4633082" indent="0">
+            <a:lvl9pPr marL="4751588" indent="0">
               <a:buNone/>
-              <a:defRPr sz="2533"/>
+              <a:defRPr sz="2598"/>
             </a:lvl9pPr>
           </a:lstStyle>
           <a:p>
@@ -2751,8 +2751,8 @@
         </p:nvSpPr>
         <p:spPr>
           <a:xfrm>
-            <a:off x="839788" y="2606040"/>
-            <a:ext cx="3932237" cy="4828011"/>
+            <a:off x="818246" y="2699862"/>
+            <a:ext cx="3831372" cy="5001827"/>
           </a:xfrm>
         </p:spPr>
         <p:txBody>
@@ -2760,39 +2760,39 @@
           <a:lstStyle>
             <a:lvl1pPr marL="0" indent="0">
               <a:buNone/>
-              <a:defRPr sz="2027"/>
+              <a:defRPr sz="2079"/>
             </a:lvl1pPr>
-            <a:lvl2pPr marL="579135" indent="0">
+            <a:lvl2pPr marL="593949" indent="0">
               <a:buNone/>
-              <a:defRPr sz="1773"/>
+              <a:defRPr sz="1819"/>
             </a:lvl2pPr>
-            <a:lvl3pPr marL="1158270" indent="0">
+            <a:lvl3pPr marL="1187897" indent="0">
               <a:buNone/>
-              <a:defRPr sz="1520"/>
+              <a:defRPr sz="1559"/>
             </a:lvl3pPr>
-            <a:lvl4pPr marL="1737406" indent="0">
+            <a:lvl4pPr marL="1781846" indent="0">
               <a:buNone/>
-              <a:defRPr sz="1267"/>
+              <a:defRPr sz="1299"/>
             </a:lvl4pPr>
-            <a:lvl5pPr marL="2316541" indent="0">
+            <a:lvl5pPr marL="2375794" indent="0">
               <a:buNone/>
-              <a:defRPr sz="1267"/>
+              <a:defRPr sz="1299"/>
             </a:lvl5pPr>
-            <a:lvl6pPr marL="2895676" indent="0">
+            <a:lvl6pPr marL="2969743" indent="0">
               <a:buNone/>
-              <a:defRPr sz="1267"/>
+              <a:defRPr sz="1299"/>
             </a:lvl6pPr>
-            <a:lvl7pPr marL="3474811" indent="0">
+            <a:lvl7pPr marL="3563691" indent="0">
               <a:buNone/>
-              <a:defRPr sz="1267"/>
+              <a:defRPr sz="1299"/>
             </a:lvl7pPr>
-            <a:lvl8pPr marL="4053947" indent="0">
+            <a:lvl8pPr marL="4157640" indent="0">
               <a:buNone/>
-              <a:defRPr sz="1267"/>
+              <a:defRPr sz="1299"/>
             </a:lvl8pPr>
-            <a:lvl9pPr marL="4633082" indent="0">
+            <a:lvl9pPr marL="4751588" indent="0">
               <a:buNone/>
-              <a:defRPr sz="1267"/>
+              <a:defRPr sz="1299"/>
             </a:lvl9pPr>
           </a:lstStyle>
           <a:p>
@@ -2821,7 +2821,7 @@
           <a:p>
             <a:fld id="{06B6001C-1240-E64C-AE44-4A843ECD4F8A}" type="datetimeFigureOut">
               <a:rPr lang="en-US" smtClean="0"/>
-              <a:t>8/13/23</a:t>
+              <a:t>9/17/24</a:t>
             </a:fld>
             <a:endParaRPr lang="en-US"/>
           </a:p>
@@ -2872,7 +2872,7 @@
     </p:spTree>
     <p:extLst>
       <p:ext uri="{BB962C8B-B14F-4D97-AF65-F5344CB8AC3E}">
-        <p14:creationId xmlns:p14="http://schemas.microsoft.com/office/powerpoint/2010/main" val="3386022628"/>
+        <p14:creationId xmlns:p14="http://schemas.microsoft.com/office/powerpoint/2010/main" val="3890247695"/>
       </p:ext>
     </p:extLst>
   </p:cSld>
@@ -2916,8 +2916,8 @@
         </p:nvSpPr>
         <p:spPr>
           <a:xfrm>
-            <a:off x="838200" y="462494"/>
-            <a:ext cx="10515600" cy="1679046"/>
+            <a:off x="816700" y="479144"/>
+            <a:ext cx="10245864" cy="1739495"/>
           </a:xfrm>
           <a:prstGeom prst="rect">
             <a:avLst/>
@@ -2949,8 +2949,8 @@
         </p:nvSpPr>
         <p:spPr>
           <a:xfrm>
-            <a:off x="838200" y="2312458"/>
-            <a:ext cx="10515600" cy="5511695"/>
+            <a:off x="816700" y="2395710"/>
+            <a:ext cx="10245864" cy="5710124"/>
           </a:xfrm>
           <a:prstGeom prst="rect">
             <a:avLst/>
@@ -3011,8 +3011,8 @@
         </p:nvSpPr>
         <p:spPr>
           <a:xfrm>
-            <a:off x="838200" y="8051378"/>
-            <a:ext cx="2743200" cy="462492"/>
+            <a:off x="816699" y="8341240"/>
+            <a:ext cx="2672834" cy="479142"/>
           </a:xfrm>
           <a:prstGeom prst="rect">
             <a:avLst/>
@@ -3022,7 +3022,7 @@
           <a:bodyPr vert="horz" lIns="91440" tIns="45720" rIns="91440" bIns="45720" rtlCol="0" anchor="ctr"/>
           <a:lstStyle>
             <a:lvl1pPr algn="l">
-              <a:defRPr sz="1520">
+              <a:defRPr sz="1559">
                 <a:solidFill>
                   <a:schemeClr val="tx1">
                     <a:tint val="75000"/>
@@ -3034,7 +3034,7 @@
           <a:p>
             <a:fld id="{06B6001C-1240-E64C-AE44-4A843ECD4F8A}" type="datetimeFigureOut">
               <a:rPr lang="en-US" smtClean="0"/>
-              <a:t>8/13/23</a:t>
+              <a:t>9/17/24</a:t>
             </a:fld>
             <a:endParaRPr lang="en-US"/>
           </a:p>
@@ -3052,8 +3052,8 @@
         </p:nvSpPr>
         <p:spPr>
           <a:xfrm>
-            <a:off x="4038600" y="8051378"/>
-            <a:ext cx="4114800" cy="462492"/>
+            <a:off x="3935006" y="8341240"/>
+            <a:ext cx="4009251" cy="479142"/>
           </a:xfrm>
           <a:prstGeom prst="rect">
             <a:avLst/>
@@ -3063,7 +3063,7 @@
           <a:bodyPr vert="horz" lIns="91440" tIns="45720" rIns="91440" bIns="45720" rtlCol="0" anchor="ctr"/>
           <a:lstStyle>
             <a:lvl1pPr algn="ctr">
-              <a:defRPr sz="1520">
+              <a:defRPr sz="1559">
                 <a:solidFill>
                   <a:schemeClr val="tx1">
                     <a:tint val="75000"/>
@@ -3089,8 +3089,8 @@
         </p:nvSpPr>
         <p:spPr>
           <a:xfrm>
-            <a:off x="8610600" y="8051378"/>
-            <a:ext cx="2743200" cy="462492"/>
+            <a:off x="8389730" y="8341240"/>
+            <a:ext cx="2672834" cy="479142"/>
           </a:xfrm>
           <a:prstGeom prst="rect">
             <a:avLst/>
@@ -3100,7 +3100,7 @@
           <a:bodyPr vert="horz" lIns="91440" tIns="45720" rIns="91440" bIns="45720" rtlCol="0" anchor="ctr"/>
           <a:lstStyle>
             <a:lvl1pPr algn="r">
-              <a:defRPr sz="1520">
+              <a:defRPr sz="1559">
                 <a:solidFill>
                   <a:schemeClr val="tx1">
                     <a:tint val="75000"/>
@@ -3121,27 +3121,27 @@
     </p:spTree>
     <p:extLst>
       <p:ext uri="{BB962C8B-B14F-4D97-AF65-F5344CB8AC3E}">
-        <p14:creationId xmlns:p14="http://schemas.microsoft.com/office/powerpoint/2010/main" val="1636921124"/>
+        <p14:creationId xmlns:p14="http://schemas.microsoft.com/office/powerpoint/2010/main" val="2655979360"/>
       </p:ext>
     </p:extLst>
   </p:cSld>
   <p:clrMap bg1="lt1" tx1="dk1" bg2="lt2" tx2="dk2" accent1="accent1" accent2="accent2" accent3="accent3" accent4="accent4" accent5="accent5" accent6="accent6" hlink="hlink" folHlink="folHlink"/>
   <p:sldLayoutIdLst>
-    <p:sldLayoutId id="2147483673" r:id="rId1"/>
-    <p:sldLayoutId id="2147483674" r:id="rId2"/>
-    <p:sldLayoutId id="2147483675" r:id="rId3"/>
-    <p:sldLayoutId id="2147483676" r:id="rId4"/>
-    <p:sldLayoutId id="2147483677" r:id="rId5"/>
-    <p:sldLayoutId id="2147483678" r:id="rId6"/>
-    <p:sldLayoutId id="2147483679" r:id="rId7"/>
-    <p:sldLayoutId id="2147483680" r:id="rId8"/>
-    <p:sldLayoutId id="2147483681" r:id="rId9"/>
-    <p:sldLayoutId id="2147483682" r:id="rId10"/>
-    <p:sldLayoutId id="2147483683" r:id="rId11"/>
+    <p:sldLayoutId id="2147483733" r:id="rId1"/>
+    <p:sldLayoutId id="2147483734" r:id="rId2"/>
+    <p:sldLayoutId id="2147483735" r:id="rId3"/>
+    <p:sldLayoutId id="2147483736" r:id="rId4"/>
+    <p:sldLayoutId id="2147483737" r:id="rId5"/>
+    <p:sldLayoutId id="2147483738" r:id="rId6"/>
+    <p:sldLayoutId id="2147483739" r:id="rId7"/>
+    <p:sldLayoutId id="2147483740" r:id="rId8"/>
+    <p:sldLayoutId id="2147483741" r:id="rId9"/>
+    <p:sldLayoutId id="2147483742" r:id="rId10"/>
+    <p:sldLayoutId id="2147483743" r:id="rId11"/>
   </p:sldLayoutIdLst>
   <p:txStyles>
     <p:titleStyle>
-      <a:lvl1pPr algn="l" defTabSz="1158270" rtl="0" eaLnBrk="1" latinLnBrk="0" hangingPunct="1">
+      <a:lvl1pPr algn="l" defTabSz="1187897" rtl="0" eaLnBrk="1" latinLnBrk="0" hangingPunct="1">
         <a:lnSpc>
           <a:spcPct val="90000"/>
         </a:lnSpc>
@@ -3149,7 +3149,7 @@
           <a:spcPct val="0"/>
         </a:spcBef>
         <a:buNone/>
-        <a:defRPr sz="5573" kern="1200">
+        <a:defRPr sz="5716" kern="1200">
           <a:solidFill>
             <a:schemeClr val="tx1"/>
           </a:solidFill>
@@ -3160,16 +3160,16 @@
       </a:lvl1pPr>
     </p:titleStyle>
     <p:bodyStyle>
-      <a:lvl1pPr marL="289568" indent="-289568" algn="l" defTabSz="1158270" rtl="0" eaLnBrk="1" latinLnBrk="0" hangingPunct="1">
+      <a:lvl1pPr marL="296974" indent="-296974" algn="l" defTabSz="1187897" rtl="0" eaLnBrk="1" latinLnBrk="0" hangingPunct="1">
         <a:lnSpc>
           <a:spcPct val="90000"/>
         </a:lnSpc>
         <a:spcBef>
-          <a:spcPts val="1267"/>
+          <a:spcPts val="1299"/>
         </a:spcBef>
         <a:buFont typeface="Arial" panose="020B0604020202020204" pitchFamily="34" charset="0"/>
         <a:buChar char="•"/>
-        <a:defRPr sz="3547" kern="1200">
+        <a:defRPr sz="3637" kern="1200">
           <a:solidFill>
             <a:schemeClr val="tx1"/>
           </a:solidFill>
@@ -3178,16 +3178,16 @@
           <a:cs typeface="+mn-cs"/>
         </a:defRPr>
       </a:lvl1pPr>
-      <a:lvl2pPr marL="868703" indent="-289568" algn="l" defTabSz="1158270" rtl="0" eaLnBrk="1" latinLnBrk="0" hangingPunct="1">
+      <a:lvl2pPr marL="890923" indent="-296974" algn="l" defTabSz="1187897" rtl="0" eaLnBrk="1" latinLnBrk="0" hangingPunct="1">
         <a:lnSpc>
           <a:spcPct val="90000"/>
         </a:lnSpc>
         <a:spcBef>
-          <a:spcPts val="633"/>
+          <a:spcPts val="650"/>
         </a:spcBef>
         <a:buFont typeface="Arial" panose="020B0604020202020204" pitchFamily="34" charset="0"/>
         <a:buChar char="•"/>
-        <a:defRPr sz="3040" kern="1200">
+        <a:defRPr sz="3118" kern="1200">
           <a:solidFill>
             <a:schemeClr val="tx1"/>
           </a:solidFill>
@@ -3196,16 +3196,16 @@
           <a:cs typeface="+mn-cs"/>
         </a:defRPr>
       </a:lvl2pPr>
-      <a:lvl3pPr marL="1447838" indent="-289568" algn="l" defTabSz="1158270" rtl="0" eaLnBrk="1" latinLnBrk="0" hangingPunct="1">
+      <a:lvl3pPr marL="1484871" indent="-296974" algn="l" defTabSz="1187897" rtl="0" eaLnBrk="1" latinLnBrk="0" hangingPunct="1">
         <a:lnSpc>
           <a:spcPct val="90000"/>
         </a:lnSpc>
         <a:spcBef>
-          <a:spcPts val="633"/>
+          <a:spcPts val="650"/>
         </a:spcBef>
         <a:buFont typeface="Arial" panose="020B0604020202020204" pitchFamily="34" charset="0"/>
         <a:buChar char="•"/>
-        <a:defRPr sz="2533" kern="1200">
+        <a:defRPr sz="2598" kern="1200">
           <a:solidFill>
             <a:schemeClr val="tx1"/>
           </a:solidFill>
@@ -3214,16 +3214,16 @@
           <a:cs typeface="+mn-cs"/>
         </a:defRPr>
       </a:lvl3pPr>
-      <a:lvl4pPr marL="2026973" indent="-289568" algn="l" defTabSz="1158270" rtl="0" eaLnBrk="1" latinLnBrk="0" hangingPunct="1">
+      <a:lvl4pPr marL="2078820" indent="-296974" algn="l" defTabSz="1187897" rtl="0" eaLnBrk="1" latinLnBrk="0" hangingPunct="1">
         <a:lnSpc>
           <a:spcPct val="90000"/>
         </a:lnSpc>
         <a:spcBef>
-          <a:spcPts val="633"/>
+          <a:spcPts val="650"/>
         </a:spcBef>
         <a:buFont typeface="Arial" panose="020B0604020202020204" pitchFamily="34" charset="0"/>
         <a:buChar char="•"/>
-        <a:defRPr sz="2280" kern="1200">
+        <a:defRPr sz="2338" kern="1200">
           <a:solidFill>
             <a:schemeClr val="tx1"/>
           </a:solidFill>
@@ -3232,16 +3232,16 @@
           <a:cs typeface="+mn-cs"/>
         </a:defRPr>
       </a:lvl4pPr>
-      <a:lvl5pPr marL="2606109" indent="-289568" algn="l" defTabSz="1158270" rtl="0" eaLnBrk="1" latinLnBrk="0" hangingPunct="1">
+      <a:lvl5pPr marL="2672768" indent="-296974" algn="l" defTabSz="1187897" rtl="0" eaLnBrk="1" latinLnBrk="0" hangingPunct="1">
         <a:lnSpc>
           <a:spcPct val="90000"/>
         </a:lnSpc>
         <a:spcBef>
-          <a:spcPts val="633"/>
+          <a:spcPts val="650"/>
         </a:spcBef>
         <a:buFont typeface="Arial" panose="020B0604020202020204" pitchFamily="34" charset="0"/>
         <a:buChar char="•"/>
-        <a:defRPr sz="2280" kern="1200">
+        <a:defRPr sz="2338" kern="1200">
           <a:solidFill>
             <a:schemeClr val="tx1"/>
           </a:solidFill>
@@ -3250,16 +3250,16 @@
           <a:cs typeface="+mn-cs"/>
         </a:defRPr>
       </a:lvl5pPr>
-      <a:lvl6pPr marL="3185244" indent="-289568" algn="l" defTabSz="1158270" rtl="0" eaLnBrk="1" latinLnBrk="0" hangingPunct="1">
+      <a:lvl6pPr marL="3266717" indent="-296974" algn="l" defTabSz="1187897" rtl="0" eaLnBrk="1" latinLnBrk="0" hangingPunct="1">
         <a:lnSpc>
           <a:spcPct val="90000"/>
         </a:lnSpc>
         <a:spcBef>
-          <a:spcPts val="633"/>
+          <a:spcPts val="650"/>
         </a:spcBef>
         <a:buFont typeface="Arial" panose="020B0604020202020204" pitchFamily="34" charset="0"/>
         <a:buChar char="•"/>
-        <a:defRPr sz="2280" kern="1200">
+        <a:defRPr sz="2338" kern="1200">
           <a:solidFill>
             <a:schemeClr val="tx1"/>
           </a:solidFill>
@@ -3268,16 +3268,16 @@
           <a:cs typeface="+mn-cs"/>
         </a:defRPr>
       </a:lvl6pPr>
-      <a:lvl7pPr marL="3764379" indent="-289568" algn="l" defTabSz="1158270" rtl="0" eaLnBrk="1" latinLnBrk="0" hangingPunct="1">
+      <a:lvl7pPr marL="3860665" indent="-296974" algn="l" defTabSz="1187897" rtl="0" eaLnBrk="1" latinLnBrk="0" hangingPunct="1">
         <a:lnSpc>
           <a:spcPct val="90000"/>
         </a:lnSpc>
         <a:spcBef>
-          <a:spcPts val="633"/>
+          <a:spcPts val="650"/>
         </a:spcBef>
         <a:buFont typeface="Arial" panose="020B0604020202020204" pitchFamily="34" charset="0"/>
         <a:buChar char="•"/>
-        <a:defRPr sz="2280" kern="1200">
+        <a:defRPr sz="2338" kern="1200">
           <a:solidFill>
             <a:schemeClr val="tx1"/>
           </a:solidFill>
@@ -3286,16 +3286,16 @@
           <a:cs typeface="+mn-cs"/>
         </a:defRPr>
       </a:lvl7pPr>
-      <a:lvl8pPr marL="4343514" indent="-289568" algn="l" defTabSz="1158270" rtl="0" eaLnBrk="1" latinLnBrk="0" hangingPunct="1">
+      <a:lvl8pPr marL="4454614" indent="-296974" algn="l" defTabSz="1187897" rtl="0" eaLnBrk="1" latinLnBrk="0" hangingPunct="1">
         <a:lnSpc>
           <a:spcPct val="90000"/>
         </a:lnSpc>
         <a:spcBef>
-          <a:spcPts val="633"/>
+          <a:spcPts val="650"/>
         </a:spcBef>
         <a:buFont typeface="Arial" panose="020B0604020202020204" pitchFamily="34" charset="0"/>
         <a:buChar char="•"/>
-        <a:defRPr sz="2280" kern="1200">
+        <a:defRPr sz="2338" kern="1200">
           <a:solidFill>
             <a:schemeClr val="tx1"/>
           </a:solidFill>
@@ -3304,16 +3304,16 @@
           <a:cs typeface="+mn-cs"/>
         </a:defRPr>
       </a:lvl8pPr>
-      <a:lvl9pPr marL="4922650" indent="-289568" algn="l" defTabSz="1158270" rtl="0" eaLnBrk="1" latinLnBrk="0" hangingPunct="1">
+      <a:lvl9pPr marL="5048562" indent="-296974" algn="l" defTabSz="1187897" rtl="0" eaLnBrk="1" latinLnBrk="0" hangingPunct="1">
         <a:lnSpc>
           <a:spcPct val="90000"/>
         </a:lnSpc>
         <a:spcBef>
-          <a:spcPts val="633"/>
+          <a:spcPts val="650"/>
         </a:spcBef>
         <a:buFont typeface="Arial" panose="020B0604020202020204" pitchFamily="34" charset="0"/>
         <a:buChar char="•"/>
-        <a:defRPr sz="2280" kern="1200">
+        <a:defRPr sz="2338" kern="1200">
           <a:solidFill>
             <a:schemeClr val="tx1"/>
           </a:solidFill>
@@ -3327,8 +3327,8 @@
       <a:defPPr>
         <a:defRPr lang="en-US"/>
       </a:defPPr>
-      <a:lvl1pPr marL="0" algn="l" defTabSz="1158270" rtl="0" eaLnBrk="1" latinLnBrk="0" hangingPunct="1">
-        <a:defRPr sz="2280" kern="1200">
+      <a:lvl1pPr marL="0" algn="l" defTabSz="1187897" rtl="0" eaLnBrk="1" latinLnBrk="0" hangingPunct="1">
+        <a:defRPr sz="2338" kern="1200">
           <a:solidFill>
             <a:schemeClr val="tx1"/>
           </a:solidFill>
@@ -3337,8 +3337,8 @@
           <a:cs typeface="+mn-cs"/>
         </a:defRPr>
       </a:lvl1pPr>
-      <a:lvl2pPr marL="579135" algn="l" defTabSz="1158270" rtl="0" eaLnBrk="1" latinLnBrk="0" hangingPunct="1">
-        <a:defRPr sz="2280" kern="1200">
+      <a:lvl2pPr marL="593949" algn="l" defTabSz="1187897" rtl="0" eaLnBrk="1" latinLnBrk="0" hangingPunct="1">
+        <a:defRPr sz="2338" kern="1200">
           <a:solidFill>
             <a:schemeClr val="tx1"/>
           </a:solidFill>
@@ -3347,8 +3347,8 @@
           <a:cs typeface="+mn-cs"/>
         </a:defRPr>
       </a:lvl2pPr>
-      <a:lvl3pPr marL="1158270" algn="l" defTabSz="1158270" rtl="0" eaLnBrk="1" latinLnBrk="0" hangingPunct="1">
-        <a:defRPr sz="2280" kern="1200">
+      <a:lvl3pPr marL="1187897" algn="l" defTabSz="1187897" rtl="0" eaLnBrk="1" latinLnBrk="0" hangingPunct="1">
+        <a:defRPr sz="2338" kern="1200">
           <a:solidFill>
             <a:schemeClr val="tx1"/>
           </a:solidFill>
@@ -3357,8 +3357,8 @@
           <a:cs typeface="+mn-cs"/>
         </a:defRPr>
       </a:lvl3pPr>
-      <a:lvl4pPr marL="1737406" algn="l" defTabSz="1158270" rtl="0" eaLnBrk="1" latinLnBrk="0" hangingPunct="1">
-        <a:defRPr sz="2280" kern="1200">
+      <a:lvl4pPr marL="1781846" algn="l" defTabSz="1187897" rtl="0" eaLnBrk="1" latinLnBrk="0" hangingPunct="1">
+        <a:defRPr sz="2338" kern="1200">
           <a:solidFill>
             <a:schemeClr val="tx1"/>
           </a:solidFill>
@@ -3367,8 +3367,8 @@
           <a:cs typeface="+mn-cs"/>
         </a:defRPr>
       </a:lvl4pPr>
-      <a:lvl5pPr marL="2316541" algn="l" defTabSz="1158270" rtl="0" eaLnBrk="1" latinLnBrk="0" hangingPunct="1">
-        <a:defRPr sz="2280" kern="1200">
+      <a:lvl5pPr marL="2375794" algn="l" defTabSz="1187897" rtl="0" eaLnBrk="1" latinLnBrk="0" hangingPunct="1">
+        <a:defRPr sz="2338" kern="1200">
           <a:solidFill>
             <a:schemeClr val="tx1"/>
           </a:solidFill>
@@ -3377,8 +3377,8 @@
           <a:cs typeface="+mn-cs"/>
         </a:defRPr>
       </a:lvl5pPr>
-      <a:lvl6pPr marL="2895676" algn="l" defTabSz="1158270" rtl="0" eaLnBrk="1" latinLnBrk="0" hangingPunct="1">
-        <a:defRPr sz="2280" kern="1200">
+      <a:lvl6pPr marL="2969743" algn="l" defTabSz="1187897" rtl="0" eaLnBrk="1" latinLnBrk="0" hangingPunct="1">
+        <a:defRPr sz="2338" kern="1200">
           <a:solidFill>
             <a:schemeClr val="tx1"/>
           </a:solidFill>
@@ -3387,8 +3387,8 @@
           <a:cs typeface="+mn-cs"/>
         </a:defRPr>
       </a:lvl6pPr>
-      <a:lvl7pPr marL="3474811" algn="l" defTabSz="1158270" rtl="0" eaLnBrk="1" latinLnBrk="0" hangingPunct="1">
-        <a:defRPr sz="2280" kern="1200">
+      <a:lvl7pPr marL="3563691" algn="l" defTabSz="1187897" rtl="0" eaLnBrk="1" latinLnBrk="0" hangingPunct="1">
+        <a:defRPr sz="2338" kern="1200">
           <a:solidFill>
             <a:schemeClr val="tx1"/>
           </a:solidFill>
@@ -3397,8 +3397,8 @@
           <a:cs typeface="+mn-cs"/>
         </a:defRPr>
       </a:lvl7pPr>
-      <a:lvl8pPr marL="4053947" algn="l" defTabSz="1158270" rtl="0" eaLnBrk="1" latinLnBrk="0" hangingPunct="1">
-        <a:defRPr sz="2280" kern="1200">
+      <a:lvl8pPr marL="4157640" algn="l" defTabSz="1187897" rtl="0" eaLnBrk="1" latinLnBrk="0" hangingPunct="1">
+        <a:defRPr sz="2338" kern="1200">
           <a:solidFill>
             <a:schemeClr val="tx1"/>
           </a:solidFill>
@@ -3407,8 +3407,8 @@
           <a:cs typeface="+mn-cs"/>
         </a:defRPr>
       </a:lvl8pPr>
-      <a:lvl9pPr marL="4633082" algn="l" defTabSz="1158270" rtl="0" eaLnBrk="1" latinLnBrk="0" hangingPunct="1">
-        <a:defRPr sz="2280" kern="1200">
+      <a:lvl9pPr marL="4751588" algn="l" defTabSz="1187897" rtl="0" eaLnBrk="1" latinLnBrk="0" hangingPunct="1">
+        <a:defRPr sz="2338" kern="1200">
           <a:solidFill>
             <a:schemeClr val="tx1"/>
           </a:solidFill>
@@ -3453,7 +3453,7 @@
         </p:nvSpPr>
         <p:spPr>
           <a:xfrm>
-            <a:off x="469912" y="3530983"/>
+            <a:off x="313543" y="4021890"/>
             <a:ext cx="3474720" cy="4735747"/>
           </a:xfrm>
           <a:prstGeom prst="roundRect">
@@ -3513,7 +3513,7 @@
         </p:nvSpPr>
         <p:spPr>
           <a:xfrm>
-            <a:off x="4365370" y="3530982"/>
+            <a:off x="4209001" y="4021889"/>
             <a:ext cx="3477426" cy="4735747"/>
           </a:xfrm>
           <a:prstGeom prst="roundRect">
@@ -3573,7 +3573,7 @@
         </p:nvSpPr>
         <p:spPr>
           <a:xfrm>
-            <a:off x="8260828" y="3530981"/>
+            <a:off x="8104459" y="4021888"/>
             <a:ext cx="3477426" cy="4735747"/>
           </a:xfrm>
           <a:prstGeom prst="roundRect">
@@ -3633,7 +3633,7 @@
         </p:nvSpPr>
         <p:spPr>
           <a:xfrm>
-            <a:off x="469200" y="3530981"/>
+            <a:off x="312831" y="4021888"/>
             <a:ext cx="3477426" cy="794761"/>
           </a:xfrm>
           <a:prstGeom prst="round2SameRect">
@@ -3694,7 +3694,7 @@
         </p:nvSpPr>
         <p:spPr>
           <a:xfrm>
-            <a:off x="4365370" y="3530980"/>
+            <a:off x="4209001" y="4021887"/>
             <a:ext cx="3477426" cy="794761"/>
           </a:xfrm>
           <a:prstGeom prst="round2SameRect">
@@ -3755,7 +3755,7 @@
         </p:nvSpPr>
         <p:spPr>
           <a:xfrm>
-            <a:off x="8260828" y="3530979"/>
+            <a:off x="8104459" y="4021886"/>
             <a:ext cx="3477426" cy="794761"/>
           </a:xfrm>
           <a:prstGeom prst="round2SameRect">
@@ -3816,7 +3816,7 @@
         </p:nvSpPr>
         <p:spPr>
           <a:xfrm>
-            <a:off x="469201" y="3739664"/>
+            <a:off x="312832" y="4230566"/>
             <a:ext cx="3474720" cy="369332"/>
           </a:xfrm>
           <a:prstGeom prst="rect">
@@ -3870,7 +3870,7 @@
         </p:nvSpPr>
         <p:spPr>
           <a:xfrm>
-            <a:off x="4361953" y="3739664"/>
+            <a:off x="4205584" y="4230566"/>
             <a:ext cx="3480130" cy="369332"/>
           </a:xfrm>
           <a:prstGeom prst="rect">
@@ -3913,7 +3913,7 @@
         </p:nvSpPr>
         <p:spPr>
           <a:xfrm>
-            <a:off x="8257410" y="3739664"/>
+            <a:off x="8101041" y="4230566"/>
             <a:ext cx="3477426" cy="369332"/>
           </a:xfrm>
           <a:prstGeom prst="rect">
@@ -3956,7 +3956,7 @@
         </p:nvSpPr>
         <p:spPr>
           <a:xfrm>
-            <a:off x="5312768" y="4666603"/>
+            <a:off x="5156399" y="5157505"/>
             <a:ext cx="2281178" cy="338554"/>
           </a:xfrm>
           <a:prstGeom prst="rect">
@@ -4010,7 +4010,7 @@
         </p:blipFill>
         <p:spPr>
           <a:xfrm>
-            <a:off x="4766340" y="4463586"/>
+            <a:off x="4609971" y="4954488"/>
             <a:ext cx="700316" cy="700316"/>
           </a:xfrm>
           <a:prstGeom prst="rect">
@@ -4032,7 +4032,7 @@
         </p:nvSpPr>
         <p:spPr>
           <a:xfrm>
-            <a:off x="5818614" y="5584822"/>
+            <a:off x="5662250" y="6075724"/>
             <a:ext cx="1414685" cy="338554"/>
           </a:xfrm>
           <a:prstGeom prst="rect">
@@ -4091,7 +4091,7 @@
         </p:blipFill>
         <p:spPr>
           <a:xfrm>
-            <a:off x="7108810" y="7620616"/>
+            <a:off x="6952441" y="8111518"/>
             <a:ext cx="428476" cy="428476"/>
           </a:xfrm>
           <a:prstGeom prst="rect">
@@ -4127,7 +4127,7 @@
         </p:blipFill>
         <p:spPr>
           <a:xfrm>
-            <a:off x="6350219" y="7620616"/>
+            <a:off x="6193850" y="8111518"/>
             <a:ext cx="428476" cy="428476"/>
           </a:xfrm>
           <a:prstGeom prst="rect">
@@ -4163,7 +4163,7 @@
         </p:blipFill>
         <p:spPr>
           <a:xfrm>
-            <a:off x="5790870" y="7620616"/>
+            <a:off x="5634501" y="8111518"/>
             <a:ext cx="428476" cy="428476"/>
           </a:xfrm>
           <a:prstGeom prst="rect">
@@ -4185,7 +4185,7 @@
         </p:nvSpPr>
         <p:spPr>
           <a:xfrm>
-            <a:off x="5603995" y="6455037"/>
+            <a:off x="5447631" y="6945944"/>
             <a:ext cx="802235" cy="307777"/>
           </a:xfrm>
           <a:prstGeom prst="rect">
@@ -4225,7 +4225,7 @@
         </p:nvSpPr>
         <p:spPr>
           <a:xfrm>
-            <a:off x="6163344" y="6455036"/>
+            <a:off x="6006980" y="6945943"/>
             <a:ext cx="802235" cy="307777"/>
           </a:xfrm>
           <a:prstGeom prst="rect">
@@ -4265,7 +4265,7 @@
         </p:nvSpPr>
         <p:spPr>
           <a:xfrm>
-            <a:off x="6921935" y="6455035"/>
+            <a:off x="6765571" y="6945942"/>
             <a:ext cx="802235" cy="307777"/>
           </a:xfrm>
           <a:prstGeom prst="rect">
@@ -4305,7 +4305,7 @@
         </p:nvSpPr>
         <p:spPr>
           <a:xfrm>
-            <a:off x="6534093" y="6455035"/>
+            <a:off x="6377729" y="6945942"/>
             <a:ext cx="802235" cy="307777"/>
           </a:xfrm>
           <a:prstGeom prst="rect">
@@ -4359,7 +4359,7 @@
         </p:blipFill>
         <p:spPr>
           <a:xfrm>
-            <a:off x="7108810" y="6762807"/>
+            <a:off x="6952441" y="7253709"/>
             <a:ext cx="428476" cy="428476"/>
           </a:xfrm>
           <a:prstGeom prst="rect">
@@ -4395,7 +4395,7 @@
         </p:blipFill>
         <p:spPr>
           <a:xfrm>
-            <a:off x="6350219" y="6762807"/>
+            <a:off x="6193850" y="7253709"/>
             <a:ext cx="428476" cy="428476"/>
           </a:xfrm>
           <a:prstGeom prst="rect">
@@ -4431,7 +4431,7 @@
         </p:blipFill>
         <p:spPr>
           <a:xfrm>
-            <a:off x="5790870" y="6762807"/>
+            <a:off x="5634501" y="7253709"/>
             <a:ext cx="428476" cy="428476"/>
           </a:xfrm>
           <a:prstGeom prst="rect">
@@ -4467,7 +4467,7 @@
         </p:blipFill>
         <p:spPr>
           <a:xfrm>
-            <a:off x="7108810" y="7138748"/>
+            <a:off x="6952441" y="7629650"/>
             <a:ext cx="428476" cy="428476"/>
           </a:xfrm>
           <a:prstGeom prst="rect">
@@ -4503,7 +4503,7 @@
         </p:blipFill>
         <p:spPr>
           <a:xfrm>
-            <a:off x="6350219" y="7138748"/>
+            <a:off x="6193850" y="7629650"/>
             <a:ext cx="428476" cy="428476"/>
           </a:xfrm>
           <a:prstGeom prst="rect">
@@ -4539,7 +4539,7 @@
         </p:blipFill>
         <p:spPr>
           <a:xfrm>
-            <a:off x="5790870" y="7138748"/>
+            <a:off x="5634501" y="7629650"/>
             <a:ext cx="428476" cy="428476"/>
           </a:xfrm>
           <a:prstGeom prst="rect">
@@ -4561,7 +4561,7 @@
         </p:nvSpPr>
         <p:spPr>
           <a:xfrm>
-            <a:off x="4584146" y="6823161"/>
+            <a:off x="4427777" y="7314068"/>
             <a:ext cx="1152924" cy="307777"/>
           </a:xfrm>
           <a:prstGeom prst="rect">
@@ -4601,7 +4601,7 @@
         </p:nvSpPr>
         <p:spPr>
           <a:xfrm>
-            <a:off x="4584146" y="7200856"/>
+            <a:off x="4427777" y="7691763"/>
             <a:ext cx="1152924" cy="307777"/>
           </a:xfrm>
           <a:prstGeom prst="rect">
@@ -4641,7 +4641,7 @@
         </p:nvSpPr>
         <p:spPr>
           <a:xfrm>
-            <a:off x="4584146" y="7678982"/>
+            <a:off x="4427777" y="8169889"/>
             <a:ext cx="1152924" cy="307777"/>
           </a:xfrm>
           <a:prstGeom prst="rect">
@@ -4681,7 +4681,7 @@
         </p:nvSpPr>
         <p:spPr>
           <a:xfrm>
-            <a:off x="4764719" y="7404794"/>
+            <a:off x="4608355" y="7895701"/>
             <a:ext cx="802235" cy="307777"/>
           </a:xfrm>
           <a:prstGeom prst="rect">
@@ -4721,7 +4721,7 @@
         </p:nvSpPr>
         <p:spPr>
           <a:xfrm rot="5400000">
-            <a:off x="5303942" y="5575658"/>
+            <a:off x="5147573" y="6066565"/>
             <a:ext cx="490528" cy="379093"/>
           </a:xfrm>
           <a:prstGeom prst="rightArrow">
@@ -4784,7 +4784,7 @@
         </p:nvSpPr>
         <p:spPr>
           <a:xfrm>
-            <a:off x="10323900" y="5262126"/>
+            <a:off x="10167536" y="5753033"/>
             <a:ext cx="985001" cy="307777"/>
           </a:xfrm>
           <a:prstGeom prst="rect">
@@ -4823,7 +4823,7 @@
         </p:nvSpPr>
         <p:spPr>
           <a:xfrm rot="16200000">
-            <a:off x="9889879" y="4719326"/>
+            <a:off x="9733515" y="5210233"/>
             <a:ext cx="731521" cy="307777"/>
           </a:xfrm>
           <a:prstGeom prst="rect">
@@ -4863,13 +4863,13 @@
           <p:nvPr>
             <p:extLst>
               <p:ext uri="{D42A27DB-BD31-4B8C-83A1-F6EECF244321}">
-                <p14:modId xmlns:p14="http://schemas.microsoft.com/office/powerpoint/2010/main" val="179973144"/>
+                <p14:modId xmlns:p14="http://schemas.microsoft.com/office/powerpoint/2010/main" val="149354797"/>
               </p:ext>
             </p:extLst>
           </p:nvPr>
         </p:nvGraphicFramePr>
         <p:xfrm>
-          <a:off x="10450636" y="4507451"/>
+          <a:off x="10294267" y="4998353"/>
           <a:ext cx="731520" cy="731520"/>
         </p:xfrm>
         <a:graphic>
@@ -5063,13 +5063,13 @@
           <p:nvPr>
             <p:extLst>
               <p:ext uri="{D42A27DB-BD31-4B8C-83A1-F6EECF244321}">
-                <p14:modId xmlns:p14="http://schemas.microsoft.com/office/powerpoint/2010/main" val="1375178337"/>
+                <p14:modId xmlns:p14="http://schemas.microsoft.com/office/powerpoint/2010/main" val="882935127"/>
               </p:ext>
             </p:extLst>
           </p:nvPr>
         </p:nvGraphicFramePr>
         <p:xfrm>
-          <a:off x="10450636" y="5827579"/>
+          <a:off x="10294267" y="6318481"/>
           <a:ext cx="731520" cy="731520"/>
         </p:xfrm>
         <a:graphic>
@@ -5270,7 +5270,7 @@
         </p:nvSpPr>
         <p:spPr>
           <a:xfrm>
-            <a:off x="10450636" y="6574424"/>
+            <a:off x="10294267" y="7065331"/>
             <a:ext cx="731520" cy="307777"/>
           </a:xfrm>
           <a:prstGeom prst="rect">
@@ -5309,7 +5309,7 @@
         </p:nvSpPr>
         <p:spPr>
           <a:xfrm rot="16200000">
-            <a:off x="9889875" y="6039454"/>
+            <a:off x="9733506" y="6530361"/>
             <a:ext cx="731522" cy="307777"/>
           </a:xfrm>
           <a:prstGeom prst="rect">
@@ -5349,13 +5349,13 @@
           <p:nvPr>
             <p:extLst>
               <p:ext uri="{D42A27DB-BD31-4B8C-83A1-F6EECF244321}">
-                <p14:modId xmlns:p14="http://schemas.microsoft.com/office/powerpoint/2010/main" val="1892412012"/>
+                <p14:modId xmlns:p14="http://schemas.microsoft.com/office/powerpoint/2010/main" val="824122478"/>
               </p:ext>
             </p:extLst>
           </p:nvPr>
         </p:nvGraphicFramePr>
         <p:xfrm>
-          <a:off x="10450636" y="7141265"/>
+          <a:off x="10294267" y="7632167"/>
           <a:ext cx="731520" cy="731520"/>
         </p:xfrm>
         <a:graphic>
@@ -5556,7 +5556,7 @@
         </p:nvSpPr>
         <p:spPr>
           <a:xfrm>
-            <a:off x="10450636" y="7888110"/>
+            <a:off x="10294267" y="8379017"/>
             <a:ext cx="731520" cy="307777"/>
           </a:xfrm>
           <a:prstGeom prst="rect">
@@ -5595,7 +5595,7 @@
         </p:nvSpPr>
         <p:spPr>
           <a:xfrm rot="16200000">
-            <a:off x="9889875" y="7353140"/>
+            <a:off x="9733506" y="7844047"/>
             <a:ext cx="731522" cy="307777"/>
           </a:xfrm>
           <a:prstGeom prst="rect">
@@ -5634,7 +5634,7 @@
         </p:nvSpPr>
         <p:spPr>
           <a:xfrm rot="5400000">
-            <a:off x="10725138" y="5583839"/>
+            <a:off x="10568769" y="6074746"/>
             <a:ext cx="182512" cy="162371"/>
           </a:xfrm>
           <a:prstGeom prst="rightArrow">
@@ -5697,7 +5697,7 @@
         </p:nvSpPr>
         <p:spPr>
           <a:xfrm rot="5400000">
-            <a:off x="10725137" y="6900066"/>
+            <a:off x="10568768" y="7390973"/>
             <a:ext cx="182512" cy="162371"/>
           </a:xfrm>
           <a:prstGeom prst="rightArrow">
@@ -5760,7 +5760,7 @@
         </p:nvSpPr>
         <p:spPr>
           <a:xfrm>
-            <a:off x="9001947" y="5391450"/>
+            <a:off x="8845578" y="5882352"/>
             <a:ext cx="1158896" cy="523220"/>
           </a:xfrm>
           <a:prstGeom prst="rect">
@@ -5805,7 +5805,7 @@
         </p:nvSpPr>
         <p:spPr>
           <a:xfrm>
-            <a:off x="9097246" y="6591709"/>
+            <a:off x="8940877" y="7082611"/>
             <a:ext cx="1025430" cy="738664"/>
           </a:xfrm>
           <a:prstGeom prst="rect">
@@ -5852,7 +5852,7 @@
         </p:nvCxnSpPr>
         <p:spPr>
           <a:xfrm>
-            <a:off x="10118113" y="5653060"/>
+            <a:off x="9961744" y="6143962"/>
             <a:ext cx="480448" cy="0"/>
           </a:xfrm>
           <a:prstGeom prst="line">
@@ -5899,7 +5899,7 @@
         </p:nvCxnSpPr>
         <p:spPr>
           <a:xfrm>
-            <a:off x="10122681" y="6961041"/>
+            <a:off x="9966317" y="7451943"/>
             <a:ext cx="501523" cy="0"/>
           </a:xfrm>
           <a:prstGeom prst="line">
@@ -5943,7 +5943,7 @@
         </p:nvSpPr>
         <p:spPr>
           <a:xfrm>
-            <a:off x="8699650" y="4719710"/>
+            <a:off x="8543281" y="5210617"/>
             <a:ext cx="1158896" cy="307777"/>
           </a:xfrm>
           <a:prstGeom prst="rect">
@@ -5982,7 +5982,7 @@
         </p:nvSpPr>
         <p:spPr>
           <a:xfrm>
-            <a:off x="8638555" y="6008671"/>
+            <a:off x="8482186" y="6499573"/>
             <a:ext cx="1326802" cy="523220"/>
           </a:xfrm>
           <a:prstGeom prst="rect">
@@ -6021,7 +6021,7 @@
         </p:nvSpPr>
         <p:spPr>
           <a:xfrm>
-            <a:off x="8679214" y="7344839"/>
+            <a:off x="8522845" y="7835741"/>
             <a:ext cx="1326802" cy="738664"/>
           </a:xfrm>
           <a:prstGeom prst="rect">
@@ -6060,7 +6060,7 @@
         </p:nvSpPr>
         <p:spPr>
           <a:xfrm>
-            <a:off x="1399698" y="4661584"/>
+            <a:off x="1243329" y="5152486"/>
             <a:ext cx="2281178" cy="338554"/>
           </a:xfrm>
           <a:prstGeom prst="rect">
@@ -6114,7 +6114,7 @@
         </p:blipFill>
         <p:spPr>
           <a:xfrm>
-            <a:off x="934198" y="4462067"/>
+            <a:off x="777829" y="4952969"/>
             <a:ext cx="700316" cy="700316"/>
           </a:xfrm>
           <a:prstGeom prst="rect">
@@ -6136,7 +6136,7 @@
         </p:nvSpPr>
         <p:spPr>
           <a:xfrm rot="5400000">
-            <a:off x="1325231" y="5463854"/>
+            <a:off x="1168862" y="5954761"/>
             <a:ext cx="369332" cy="308449"/>
           </a:xfrm>
           <a:prstGeom prst="rightArrow">
@@ -6199,7 +6199,7 @@
         </p:nvSpPr>
         <p:spPr>
           <a:xfrm rot="5400000">
-            <a:off x="1322136" y="6920503"/>
+            <a:off x="1165767" y="7411410"/>
             <a:ext cx="369332" cy="308449"/>
           </a:xfrm>
           <a:prstGeom prst="rightArrow">
@@ -6262,7 +6262,7 @@
         </p:nvSpPr>
         <p:spPr>
           <a:xfrm>
-            <a:off x="1009170" y="7556941"/>
+            <a:off x="852801" y="8047843"/>
             <a:ext cx="2281178" cy="338554"/>
           </a:xfrm>
           <a:prstGeom prst="rect">
@@ -6302,7 +6302,7 @@
         </p:nvSpPr>
         <p:spPr>
           <a:xfrm>
-            <a:off x="847806" y="6156164"/>
+            <a:off x="691442" y="6647066"/>
             <a:ext cx="2614333" cy="338554"/>
           </a:xfrm>
           <a:prstGeom prst="rect">
@@ -6342,7 +6342,7 @@
         </p:nvSpPr>
         <p:spPr>
           <a:xfrm>
-            <a:off x="1831337" y="5226204"/>
+            <a:off x="1674973" y="5717106"/>
             <a:ext cx="1704529" cy="738664"/>
           </a:xfrm>
           <a:prstGeom prst="rect">
@@ -6387,7 +6387,7 @@
         </p:nvSpPr>
         <p:spPr>
           <a:xfrm>
-            <a:off x="1766021" y="6779458"/>
+            <a:off x="1609657" y="7270360"/>
             <a:ext cx="1704529" cy="523220"/>
           </a:xfrm>
           <a:prstGeom prst="rect">
@@ -6432,7 +6432,7 @@
         </p:nvSpPr>
         <p:spPr>
           <a:xfrm>
-            <a:off x="3967819" y="5893580"/>
+            <a:off x="3811455" y="6384487"/>
             <a:ext cx="363729" cy="498423"/>
           </a:xfrm>
           <a:prstGeom prst="rightArrow">
@@ -6490,7 +6490,7 @@
         </p:nvSpPr>
         <p:spPr>
           <a:xfrm>
-            <a:off x="7865739" y="5893579"/>
+            <a:off x="7709375" y="6384486"/>
             <a:ext cx="363729" cy="498423"/>
           </a:xfrm>
           <a:prstGeom prst="rightArrow">
@@ -6548,8 +6548,8 @@
         </p:nvSpPr>
         <p:spPr>
           <a:xfrm>
-            <a:off x="469200" y="400539"/>
-            <a:ext cx="11252888" cy="2711354"/>
+            <a:off x="312831" y="271077"/>
+            <a:ext cx="11252888" cy="3331723"/>
           </a:xfrm>
           <a:prstGeom prst="roundRect">
             <a:avLst>
@@ -6609,14 +6609,14 @@
           <p:nvPr>
             <p:extLst>
               <p:ext uri="{D42A27DB-BD31-4B8C-83A1-F6EECF244321}">
-                <p14:modId xmlns:p14="http://schemas.microsoft.com/office/powerpoint/2010/main" val="3062297741"/>
+                <p14:modId xmlns:p14="http://schemas.microsoft.com/office/powerpoint/2010/main" val="3718444960"/>
               </p:ext>
             </p:extLst>
           </p:nvPr>
         </p:nvGraphicFramePr>
         <p:xfrm>
-          <a:off x="1532277" y="651482"/>
-          <a:ext cx="9913188" cy="2220054"/>
+          <a:off x="1375908" y="540222"/>
+          <a:ext cx="9913188" cy="2799174"/>
         </p:xfrm>
         <a:graphic>
           <a:graphicData uri="http://schemas.openxmlformats.org/drawingml/2006/table">
@@ -7337,6 +7337,301 @@
                     </a:p>
                   </a:txBody>
                   <a:tcPr anchor="ctr">
+                    <a:solidFill>
+                      <a:schemeClr val="accent5"/>
+                    </a:solidFill>
+                  </a:tcPr>
+                </a:tc>
+                <a:tc>
+                  <a:txBody>
+                    <a:bodyPr/>
+                    <a:lstStyle/>
+                    <a:p>
+                      <a:pPr algn="ctr"/>
+                      <a:r>
+                        <a:rPr lang="en-US" sz="1600" dirty="0">
+                          <a:latin typeface="Helvetica Neue" panose="02000503000000020004" pitchFamily="2" charset="0"/>
+                          <a:ea typeface="Helvetica Neue" panose="02000503000000020004" pitchFamily="2" charset="0"/>
+                          <a:cs typeface="Helvetica Neue" panose="02000503000000020004" pitchFamily="2" charset="0"/>
+                        </a:rPr>
+                        <a:t>2021/11/24</a:t>
+                      </a:r>
+                    </a:p>
+                  </a:txBody>
+                  <a:tcPr anchor="ctr">
+                    <a:lnT w="28575" cap="flat" cmpd="sng" algn="ctr">
+                      <a:solidFill>
+                        <a:schemeClr val="bg1"/>
+                      </a:solidFill>
+                      <a:prstDash val="solid"/>
+                      <a:round/>
+                      <a:headEnd type="none" w="med" len="med"/>
+                      <a:tailEnd type="none" w="med" len="med"/>
+                    </a:lnT>
+                    <a:lnB w="28575" cap="flat" cmpd="sng" algn="ctr">
+                      <a:solidFill>
+                        <a:schemeClr val="bg1"/>
+                      </a:solidFill>
+                      <a:prstDash val="solid"/>
+                      <a:round/>
+                      <a:headEnd type="none" w="med" len="med"/>
+                      <a:tailEnd type="none" w="med" len="med"/>
+                    </a:lnB>
+                  </a:tcPr>
+                </a:tc>
+                <a:tc>
+                  <a:txBody>
+                    <a:bodyPr/>
+                    <a:lstStyle/>
+                    <a:p>
+                      <a:pPr marL="0" marR="0" lvl="0" indent="0" algn="ctr" defTabSz="914400" rtl="0" eaLnBrk="1" fontAlgn="auto" latinLnBrk="0" hangingPunct="1">
+                        <a:lnSpc>
+                          <a:spcPct val="100000"/>
+                        </a:lnSpc>
+                        <a:spcBef>
+                          <a:spcPts val="0"/>
+                        </a:spcBef>
+                        <a:spcAft>
+                          <a:spcPts val="0"/>
+                        </a:spcAft>
+                        <a:buClrTx/>
+                        <a:buSzTx/>
+                        <a:buFontTx/>
+                        <a:buNone/>
+                        <a:tabLst/>
+                        <a:defRPr/>
+                      </a:pPr>
+                      <a:r>
+                        <a:rPr lang="en-US" sz="1600" dirty="0">
+                          <a:latin typeface="Helvetica Neue" panose="02000503000000020004" pitchFamily="2" charset="0"/>
+                          <a:ea typeface="Helvetica Neue" panose="02000503000000020004" pitchFamily="2" charset="0"/>
+                          <a:cs typeface="Helvetica Neue" panose="02000503000000020004" pitchFamily="2" charset="0"/>
+                        </a:rPr>
+                        <a:t>RA patients</a:t>
+                      </a:r>
+                    </a:p>
+                  </a:txBody>
+                  <a:tcPr anchor="ctr">
+                    <a:lnT w="28575" cap="flat" cmpd="sng" algn="ctr">
+                      <a:solidFill>
+                        <a:schemeClr val="bg1"/>
+                      </a:solidFill>
+                      <a:prstDash val="solid"/>
+                      <a:round/>
+                      <a:headEnd type="none" w="med" len="med"/>
+                      <a:tailEnd type="none" w="med" len="med"/>
+                    </a:lnT>
+                    <a:lnB w="28575" cap="flat" cmpd="sng" algn="ctr">
+                      <a:solidFill>
+                        <a:schemeClr val="bg1"/>
+                      </a:solidFill>
+                      <a:prstDash val="solid"/>
+                      <a:round/>
+                      <a:headEnd type="none" w="med" len="med"/>
+                      <a:tailEnd type="none" w="med" len="med"/>
+                    </a:lnB>
+                  </a:tcPr>
+                </a:tc>
+                <a:tc>
+                  <a:txBody>
+                    <a:bodyPr/>
+                    <a:lstStyle/>
+                    <a:p>
+                      <a:pPr marL="0" marR="0" lvl="0" indent="0" algn="ctr" defTabSz="914400" rtl="0" eaLnBrk="1" fontAlgn="auto" latinLnBrk="0" hangingPunct="1">
+                        <a:lnSpc>
+                          <a:spcPct val="100000"/>
+                        </a:lnSpc>
+                        <a:spcBef>
+                          <a:spcPts val="0"/>
+                        </a:spcBef>
+                        <a:spcAft>
+                          <a:spcPts val="0"/>
+                        </a:spcAft>
+                        <a:buClrTx/>
+                        <a:buSzTx/>
+                        <a:buFontTx/>
+                        <a:buNone/>
+                        <a:tabLst/>
+                        <a:defRPr/>
+                      </a:pPr>
+                      <a:r>
+                        <a:rPr lang="en-US" sz="1600" dirty="0">
+                          <a:latin typeface="Helvetica Neue" panose="02000503000000020004" pitchFamily="2" charset="0"/>
+                          <a:ea typeface="Helvetica Neue" panose="02000503000000020004" pitchFamily="2" charset="0"/>
+                          <a:cs typeface="Helvetica Neue" panose="02000503000000020004" pitchFamily="2" charset="0"/>
+                        </a:rPr>
+                        <a:t>Response &amp; Non-response</a:t>
+                      </a:r>
+                    </a:p>
+                  </a:txBody>
+                  <a:tcPr anchor="ctr">
+                    <a:lnT w="28575" cap="flat" cmpd="sng" algn="ctr">
+                      <a:solidFill>
+                        <a:schemeClr val="bg1"/>
+                      </a:solidFill>
+                      <a:prstDash val="solid"/>
+                      <a:round/>
+                      <a:headEnd type="none" w="med" len="med"/>
+                      <a:tailEnd type="none" w="med" len="med"/>
+                    </a:lnT>
+                    <a:lnB w="28575" cap="flat" cmpd="sng" algn="ctr">
+                      <a:solidFill>
+                        <a:schemeClr val="bg1"/>
+                      </a:solidFill>
+                      <a:prstDash val="solid"/>
+                      <a:round/>
+                      <a:headEnd type="none" w="med" len="med"/>
+                      <a:tailEnd type="none" w="med" len="med"/>
+                    </a:lnB>
+                  </a:tcPr>
+                </a:tc>
+                <a:tc>
+                  <a:txBody>
+                    <a:bodyPr/>
+                    <a:lstStyle/>
+                    <a:p>
+                      <a:pPr algn="ctr"/>
+                      <a:r>
+                        <a:rPr lang="en-US" sz="1600" dirty="0">
+                          <a:latin typeface="Helvetica Neue" panose="02000503000000020004" pitchFamily="2" charset="0"/>
+                          <a:ea typeface="Helvetica Neue" panose="02000503000000020004" pitchFamily="2" charset="0"/>
+                          <a:cs typeface="Helvetica Neue" panose="02000503000000020004" pitchFamily="2" charset="0"/>
+                        </a:rPr>
+                        <a:t>584</a:t>
+                      </a:r>
+                    </a:p>
+                  </a:txBody>
+                  <a:tcPr anchor="ctr">
+                    <a:lnT w="28575" cap="flat" cmpd="sng" algn="ctr">
+                      <a:solidFill>
+                        <a:schemeClr val="bg1"/>
+                      </a:solidFill>
+                      <a:prstDash val="solid"/>
+                      <a:round/>
+                      <a:headEnd type="none" w="med" len="med"/>
+                      <a:tailEnd type="none" w="med" len="med"/>
+                    </a:lnT>
+                    <a:lnB w="28575" cap="flat" cmpd="sng" algn="ctr">
+                      <a:solidFill>
+                        <a:schemeClr val="bg1"/>
+                      </a:solidFill>
+                      <a:prstDash val="solid"/>
+                      <a:round/>
+                      <a:headEnd type="none" w="med" len="med"/>
+                      <a:tailEnd type="none" w="med" len="med"/>
+                    </a:lnB>
+                  </a:tcPr>
+                </a:tc>
+                <a:tc>
+                  <a:txBody>
+                    <a:bodyPr/>
+                    <a:lstStyle/>
+                    <a:p>
+                      <a:pPr algn="ctr"/>
+                      <a:r>
+                        <a:rPr lang="en-US" sz="1600" dirty="0">
+                          <a:latin typeface="Helvetica Neue" panose="02000503000000020004" pitchFamily="2" charset="0"/>
+                          <a:ea typeface="Helvetica Neue" panose="02000503000000020004" pitchFamily="2" charset="0"/>
+                          <a:cs typeface="Helvetica Neue" panose="02000503000000020004" pitchFamily="2" charset="0"/>
+                        </a:rPr>
+                        <a:t>261</a:t>
+                      </a:r>
+                    </a:p>
+                  </a:txBody>
+                  <a:tcPr anchor="ctr">
+                    <a:lnT w="28575" cap="flat" cmpd="sng" algn="ctr">
+                      <a:solidFill>
+                        <a:schemeClr val="bg1"/>
+                      </a:solidFill>
+                      <a:prstDash val="solid"/>
+                      <a:round/>
+                      <a:headEnd type="none" w="med" len="med"/>
+                      <a:tailEnd type="none" w="med" len="med"/>
+                    </a:lnT>
+                    <a:lnB w="28575" cap="flat" cmpd="sng" algn="ctr">
+                      <a:solidFill>
+                        <a:schemeClr val="bg1"/>
+                      </a:solidFill>
+                      <a:prstDash val="solid"/>
+                      <a:round/>
+                      <a:headEnd type="none" w="med" len="med"/>
+                      <a:tailEnd type="none" w="med" len="med"/>
+                    </a:lnB>
+                  </a:tcPr>
+                </a:tc>
+                <a:tc>
+                  <a:txBody>
+                    <a:bodyPr/>
+                    <a:lstStyle/>
+                    <a:p>
+                      <a:pPr algn="ctr"/>
+                      <a:r>
+                        <a:rPr lang="en-US" sz="1600" dirty="0">
+                          <a:latin typeface="Helvetica Neue" panose="02000503000000020004" pitchFamily="2" charset="0"/>
+                          <a:ea typeface="Helvetica Neue" panose="02000503000000020004" pitchFamily="2" charset="0"/>
+                          <a:cs typeface="Helvetica Neue" panose="02000503000000020004" pitchFamily="2" charset="0"/>
+                        </a:rPr>
+                        <a:t>24,219</a:t>
+                      </a:r>
+                    </a:p>
+                  </a:txBody>
+                  <a:tcPr anchor="ctr">
+                    <a:lnR w="28575" cap="flat" cmpd="sng" algn="ctr">
+                      <a:solidFill>
+                        <a:schemeClr val="accent5"/>
+                      </a:solidFill>
+                      <a:prstDash val="solid"/>
+                      <a:round/>
+                      <a:headEnd type="none" w="med" len="med"/>
+                      <a:tailEnd type="none" w="med" len="med"/>
+                    </a:lnR>
+                    <a:lnT w="28575" cap="flat" cmpd="sng" algn="ctr">
+                      <a:solidFill>
+                        <a:schemeClr val="bg1"/>
+                      </a:solidFill>
+                      <a:prstDash val="solid"/>
+                      <a:round/>
+                      <a:headEnd type="none" w="med" len="med"/>
+                      <a:tailEnd type="none" w="med" len="med"/>
+                    </a:lnT>
+                    <a:lnB w="28575" cap="flat" cmpd="sng" algn="ctr">
+                      <a:solidFill>
+                        <a:schemeClr val="bg1"/>
+                      </a:solidFill>
+                      <a:prstDash val="solid"/>
+                      <a:round/>
+                      <a:headEnd type="none" w="med" len="med"/>
+                      <a:tailEnd type="none" w="med" len="med"/>
+                    </a:lnB>
+                  </a:tcPr>
+                </a:tc>
+                <a:extLst>
+                  <a:ext uri="{0D108BD9-81ED-4DB2-BD59-A6C34878D82A}">
+                    <a16:rowId xmlns:a16="http://schemas.microsoft.com/office/drawing/2014/main" val="3353457721"/>
+                  </a:ext>
+                </a:extLst>
+              </a:tr>
+              <a:tr h="571977">
+                <a:tc>
+                  <a:txBody>
+                    <a:bodyPr/>
+                    <a:lstStyle/>
+                    <a:p>
+                      <a:pPr algn="ctr"/>
+                      <a:r>
+                        <a:rPr lang="en-US" sz="1600" b="1" dirty="0">
+                          <a:solidFill>
+                            <a:schemeClr val="bg1"/>
+                          </a:solidFill>
+                          <a:latin typeface="Helvetica Neue" panose="02000503000000020004" pitchFamily="2" charset="0"/>
+                          <a:ea typeface="Helvetica Neue" panose="02000503000000020004" pitchFamily="2" charset="0"/>
+                          <a:cs typeface="Helvetica Neue" panose="02000503000000020004" pitchFamily="2" charset="0"/>
+                        </a:rPr>
+                        <a:t>GSE193677</a:t>
+                      </a:r>
+                    </a:p>
+                  </a:txBody>
+                  <a:tcPr anchor="ctr">
                     <a:lnB w="28575" cap="flat" cmpd="sng" algn="ctr">
                       <a:solidFill>
                         <a:schemeClr val="accent5"/>
@@ -7363,7 +7658,7 @@
                           <a:ea typeface="Helvetica Neue" panose="02000503000000020004" pitchFamily="2" charset="0"/>
                           <a:cs typeface="Helvetica Neue" panose="02000503000000020004" pitchFamily="2" charset="0"/>
                         </a:rPr>
-                        <a:t>2021/11/24</a:t>
+                        <a:t>2022</a:t>
                       </a:r>
                     </a:p>
                   </a:txBody>
@@ -7416,7 +7711,7 @@
                           <a:ea typeface="Helvetica Neue" panose="02000503000000020004" pitchFamily="2" charset="0"/>
                           <a:cs typeface="Helvetica Neue" panose="02000503000000020004" pitchFamily="2" charset="0"/>
                         </a:rPr>
-                        <a:t>RA patients</a:t>
+                        <a:t>CD and UC patients</a:t>
                       </a:r>
                     </a:p>
                   </a:txBody>
@@ -7469,7 +7764,7 @@
                           <a:ea typeface="Helvetica Neue" panose="02000503000000020004" pitchFamily="2" charset="0"/>
                           <a:cs typeface="Helvetica Neue" panose="02000503000000020004" pitchFamily="2" charset="0"/>
                         </a:rPr>
-                        <a:t>Response &amp; Non-response</a:t>
+                        <a:t>5 tissue types</a:t>
                       </a:r>
                     </a:p>
                   </a:txBody>
@@ -7506,7 +7801,7 @@
                           <a:ea typeface="Helvetica Neue" panose="02000503000000020004" pitchFamily="2" charset="0"/>
                           <a:cs typeface="Helvetica Neue" panose="02000503000000020004" pitchFamily="2" charset="0"/>
                         </a:rPr>
-                        <a:t>584</a:t>
+                        <a:t>2,490</a:t>
                       </a:r>
                     </a:p>
                   </a:txBody>
@@ -7543,7 +7838,7 @@
                           <a:ea typeface="Helvetica Neue" panose="02000503000000020004" pitchFamily="2" charset="0"/>
                           <a:cs typeface="Helvetica Neue" panose="02000503000000020004" pitchFamily="2" charset="0"/>
                         </a:rPr>
-                        <a:t>261</a:t>
+                        <a:t>1,162</a:t>
                       </a:r>
                     </a:p>
                   </a:txBody>
@@ -7580,7 +7875,7 @@
                           <a:ea typeface="Helvetica Neue" panose="02000503000000020004" pitchFamily="2" charset="0"/>
                           <a:cs typeface="Helvetica Neue" panose="02000503000000020004" pitchFamily="2" charset="0"/>
                         </a:rPr>
-                        <a:t>24,219</a:t>
+                        <a:t>18,197</a:t>
                       </a:r>
                     </a:p>
                   </a:txBody>
@@ -7616,7 +7911,7 @@
                 </a:tc>
                 <a:extLst>
                   <a:ext uri="{0D108BD9-81ED-4DB2-BD59-A6C34878D82A}">
-                    <a16:rowId xmlns:a16="http://schemas.microsoft.com/office/drawing/2014/main" val="3353457721"/>
+                    <a16:rowId xmlns:a16="http://schemas.microsoft.com/office/drawing/2014/main" val="3592277178"/>
                   </a:ext>
                 </a:extLst>
               </a:tr>
@@ -7638,8 +7933,8 @@
         </p:nvSpPr>
         <p:spPr>
           <a:xfrm rot="16200000">
-            <a:off x="-484453" y="1363476"/>
-            <a:ext cx="2702073" cy="794761"/>
+            <a:off x="-956724" y="1538480"/>
+            <a:ext cx="3333877" cy="794761"/>
           </a:xfrm>
           <a:prstGeom prst="round2SameRect">
             <a:avLst>
@@ -7699,8 +7994,8 @@
         </p:nvSpPr>
         <p:spPr>
           <a:xfrm rot="16200000">
-            <a:off x="-489096" y="1569397"/>
-            <a:ext cx="2711354" cy="369332"/>
+            <a:off x="-955650" y="1750115"/>
+            <a:ext cx="3331723" cy="369332"/>
           </a:xfrm>
           <a:prstGeom prst="rect">
             <a:avLst/>
@@ -7742,7 +8037,7 @@
         </p:nvSpPr>
         <p:spPr>
           <a:xfrm rot="5400000">
-            <a:off x="2026049" y="3066064"/>
+            <a:off x="1869685" y="3556971"/>
             <a:ext cx="363729" cy="498423"/>
           </a:xfrm>
           <a:prstGeom prst="rightArrow">
@@ -8054,7 +8349,7 @@
   <a:extraClrSchemeLst/>
   <a:extLst>
     <a:ext uri="{05A4C25C-085E-4340-85A3-A5531E510DB2}">
-      <thm15:themeFamily xmlns:thm15="http://schemas.microsoft.com/office/thememl/2012/main" name="Office Theme" id="{62F939B6-93AF-4DB8-9C6B-D6C7DFDC589F}" vid="{4A3C46E8-61CC-4603-A589-7422A47A8E4A}"/>
+      <thm15:themeFamily xmlns:thm15="http://schemas.microsoft.com/office/thememl/2012/main" name="Office 2013 - 2022 Theme" id="{62F939B6-93AF-4DB8-9C6B-D6C7DFDC589F}" vid="{4A3C46E8-61CC-4603-A589-7422A47A8E4A}"/>
     </a:ext>
   </a:extLst>
 </a:theme>

</xml_diff>